<commit_message>
refactor: changed strategy pattern with lambdas
</commit_message>
<xml_diff>
--- a/Prezentacia.pptx
+++ b/Prezentacia.pptx
@@ -15,6 +15,7 @@
     <p:sldId id="260" r:id="rId9"/>
     <p:sldId id="265" r:id="rId10"/>
     <p:sldId id="262" r:id="rId11"/>
+    <p:sldId id="266" r:id="rId12"/>
   </p:sldIdLst>
   <p:sldSz cx="12192000" cy="6858000"/>
   <p:notesSz cx="6858000" cy="9144000"/>
@@ -270,7 +271,7 @@
           <a:p>
             <a:fld id="{1595C0F1-D55A-914C-B75E-24AFA456FADE}" type="datetimeFigureOut">
               <a:rPr lang="en-SK" smtClean="0"/>
-              <a:t>07/10/2022</a:t>
+              <a:t>09/10/2022</a:t>
             </a:fld>
             <a:endParaRPr lang="en-SK"/>
           </a:p>
@@ -470,7 +471,7 @@
           <a:p>
             <a:fld id="{1595C0F1-D55A-914C-B75E-24AFA456FADE}" type="datetimeFigureOut">
               <a:rPr lang="en-SK" smtClean="0"/>
-              <a:t>07/10/2022</a:t>
+              <a:t>09/10/2022</a:t>
             </a:fld>
             <a:endParaRPr lang="en-SK"/>
           </a:p>
@@ -680,7 +681,7 @@
           <a:p>
             <a:fld id="{1595C0F1-D55A-914C-B75E-24AFA456FADE}" type="datetimeFigureOut">
               <a:rPr lang="en-SK" smtClean="0"/>
-              <a:t>07/10/2022</a:t>
+              <a:t>09/10/2022</a:t>
             </a:fld>
             <a:endParaRPr lang="en-SK"/>
           </a:p>
@@ -880,7 +881,7 @@
           <a:p>
             <a:fld id="{1595C0F1-D55A-914C-B75E-24AFA456FADE}" type="datetimeFigureOut">
               <a:rPr lang="en-SK" smtClean="0"/>
-              <a:t>07/10/2022</a:t>
+              <a:t>09/10/2022</a:t>
             </a:fld>
             <a:endParaRPr lang="en-SK"/>
           </a:p>
@@ -1156,7 +1157,7 @@
           <a:p>
             <a:fld id="{1595C0F1-D55A-914C-B75E-24AFA456FADE}" type="datetimeFigureOut">
               <a:rPr lang="en-SK" smtClean="0"/>
-              <a:t>07/10/2022</a:t>
+              <a:t>09/10/2022</a:t>
             </a:fld>
             <a:endParaRPr lang="en-SK"/>
           </a:p>
@@ -1424,7 +1425,7 @@
           <a:p>
             <a:fld id="{1595C0F1-D55A-914C-B75E-24AFA456FADE}" type="datetimeFigureOut">
               <a:rPr lang="en-SK" smtClean="0"/>
-              <a:t>07/10/2022</a:t>
+              <a:t>09/10/2022</a:t>
             </a:fld>
             <a:endParaRPr lang="en-SK"/>
           </a:p>
@@ -1839,7 +1840,7 @@
           <a:p>
             <a:fld id="{1595C0F1-D55A-914C-B75E-24AFA456FADE}" type="datetimeFigureOut">
               <a:rPr lang="en-SK" smtClean="0"/>
-              <a:t>07/10/2022</a:t>
+              <a:t>09/10/2022</a:t>
             </a:fld>
             <a:endParaRPr lang="en-SK"/>
           </a:p>
@@ -1981,7 +1982,7 @@
           <a:p>
             <a:fld id="{1595C0F1-D55A-914C-B75E-24AFA456FADE}" type="datetimeFigureOut">
               <a:rPr lang="en-SK" smtClean="0"/>
-              <a:t>07/10/2022</a:t>
+              <a:t>09/10/2022</a:t>
             </a:fld>
             <a:endParaRPr lang="en-SK"/>
           </a:p>
@@ -2094,7 +2095,7 @@
           <a:p>
             <a:fld id="{1595C0F1-D55A-914C-B75E-24AFA456FADE}" type="datetimeFigureOut">
               <a:rPr lang="en-SK" smtClean="0"/>
-              <a:t>07/10/2022</a:t>
+              <a:t>09/10/2022</a:t>
             </a:fld>
             <a:endParaRPr lang="en-SK"/>
           </a:p>
@@ -2407,7 +2408,7 @@
           <a:p>
             <a:fld id="{1595C0F1-D55A-914C-B75E-24AFA456FADE}" type="datetimeFigureOut">
               <a:rPr lang="en-SK" smtClean="0"/>
-              <a:t>07/10/2022</a:t>
+              <a:t>09/10/2022</a:t>
             </a:fld>
             <a:endParaRPr lang="en-SK"/>
           </a:p>
@@ -2696,7 +2697,7 @@
           <a:p>
             <a:fld id="{1595C0F1-D55A-914C-B75E-24AFA456FADE}" type="datetimeFigureOut">
               <a:rPr lang="en-SK" smtClean="0"/>
-              <a:t>07/10/2022</a:t>
+              <a:t>09/10/2022</a:t>
             </a:fld>
             <a:endParaRPr lang="en-SK"/>
           </a:p>
@@ -2939,7 +2940,7 @@
           <a:p>
             <a:fld id="{1595C0F1-D55A-914C-B75E-24AFA456FADE}" type="datetimeFigureOut">
               <a:rPr lang="en-SK" smtClean="0"/>
-              <a:t>07/10/2022</a:t>
+              <a:t>09/10/2022</a:t>
             </a:fld>
             <a:endParaRPr lang="en-SK"/>
           </a:p>
@@ -3600,6 +3601,156 @@
 </p:sld>
 </file>
 
+<file path=ppt/slides/slide11.xml><?xml version="1.0" encoding="utf-8"?>
+<p:sld xmlns:a="http://schemas.openxmlformats.org/drawingml/2006/main" xmlns:r="http://schemas.openxmlformats.org/officeDocument/2006/relationships" xmlns:p="http://schemas.openxmlformats.org/presentationml/2006/main">
+  <p:cSld>
+    <p:spTree>
+      <p:nvGrpSpPr>
+        <p:cNvPr id="1" name=""/>
+        <p:cNvGrpSpPr/>
+        <p:nvPr/>
+      </p:nvGrpSpPr>
+      <p:grpSpPr>
+        <a:xfrm>
+          <a:off x="0" y="0"/>
+          <a:ext cx="0" cy="0"/>
+          <a:chOff x="0" y="0"/>
+          <a:chExt cx="0" cy="0"/>
+        </a:xfrm>
+      </p:grpSpPr>
+      <p:pic>
+        <p:nvPicPr>
+          <p:cNvPr id="5" name="Picture 4" descr="Diagram&#10;&#10;Description automatically generated">
+            <a:extLst>
+              <a:ext uri="{FF2B5EF4-FFF2-40B4-BE49-F238E27FC236}">
+                <a16:creationId xmlns:a16="http://schemas.microsoft.com/office/drawing/2014/main" id="{B6212300-B473-64CC-FF31-4CF961FC30F5}"/>
+              </a:ext>
+            </a:extLst>
+          </p:cNvPr>
+          <p:cNvPicPr>
+            <a:picLocks noChangeAspect="1"/>
+          </p:cNvPicPr>
+          <p:nvPr/>
+        </p:nvPicPr>
+        <p:blipFill>
+          <a:blip r:embed="rId2"/>
+          <a:stretch>
+            <a:fillRect/>
+          </a:stretch>
+        </p:blipFill>
+        <p:spPr>
+          <a:xfrm>
+            <a:off x="4353641" y="452925"/>
+            <a:ext cx="2429170" cy="2640840"/>
+          </a:xfrm>
+          <a:prstGeom prst="rect">
+            <a:avLst/>
+          </a:prstGeom>
+        </p:spPr>
+      </p:pic>
+      <p:pic>
+        <p:nvPicPr>
+          <p:cNvPr id="7" name="Picture 6" descr="Graphical user interface, text&#10;&#10;Description automatically generated">
+            <a:extLst>
+              <a:ext uri="{FF2B5EF4-FFF2-40B4-BE49-F238E27FC236}">
+                <a16:creationId xmlns:a16="http://schemas.microsoft.com/office/drawing/2014/main" id="{BF6707D5-6FAB-BCCC-EA48-FB4CC7A85171}"/>
+              </a:ext>
+            </a:extLst>
+          </p:cNvPr>
+          <p:cNvPicPr>
+            <a:picLocks noChangeAspect="1"/>
+          </p:cNvPicPr>
+          <p:nvPr/>
+        </p:nvPicPr>
+        <p:blipFill>
+          <a:blip r:embed="rId3"/>
+          <a:stretch>
+            <a:fillRect/>
+          </a:stretch>
+        </p:blipFill>
+        <p:spPr>
+          <a:xfrm>
+            <a:off x="709964" y="1090428"/>
+            <a:ext cx="3162300" cy="762000"/>
+          </a:xfrm>
+          <a:prstGeom prst="rect">
+            <a:avLst/>
+          </a:prstGeom>
+        </p:spPr>
+      </p:pic>
+      <p:pic>
+        <p:nvPicPr>
+          <p:cNvPr id="9" name="Picture 8" descr="Graphical user interface, application&#10;&#10;Description automatically generated">
+            <a:extLst>
+              <a:ext uri="{FF2B5EF4-FFF2-40B4-BE49-F238E27FC236}">
+                <a16:creationId xmlns:a16="http://schemas.microsoft.com/office/drawing/2014/main" id="{6F70098D-F895-7FCF-EF7B-E23831C36CF4}"/>
+              </a:ext>
+            </a:extLst>
+          </p:cNvPr>
+          <p:cNvPicPr>
+            <a:picLocks noChangeAspect="1"/>
+          </p:cNvPicPr>
+          <p:nvPr/>
+        </p:nvPicPr>
+        <p:blipFill>
+          <a:blip r:embed="rId4"/>
+          <a:stretch>
+            <a:fillRect/>
+          </a:stretch>
+        </p:blipFill>
+        <p:spPr>
+          <a:xfrm>
+            <a:off x="7415180" y="829869"/>
+            <a:ext cx="4478156" cy="1492719"/>
+          </a:xfrm>
+          <a:prstGeom prst="rect">
+            <a:avLst/>
+          </a:prstGeom>
+        </p:spPr>
+      </p:pic>
+      <p:pic>
+        <p:nvPicPr>
+          <p:cNvPr id="11" name="Picture 10" descr="Text&#10;&#10;Description automatically generated">
+            <a:extLst>
+              <a:ext uri="{FF2B5EF4-FFF2-40B4-BE49-F238E27FC236}">
+                <a16:creationId xmlns:a16="http://schemas.microsoft.com/office/drawing/2014/main" id="{9EE8356B-F0FB-D303-3B9E-C790616F70B8}"/>
+              </a:ext>
+            </a:extLst>
+          </p:cNvPr>
+          <p:cNvPicPr>
+            <a:picLocks noChangeAspect="1"/>
+          </p:cNvPicPr>
+          <p:nvPr/>
+        </p:nvPicPr>
+        <p:blipFill>
+          <a:blip r:embed="rId5"/>
+          <a:stretch>
+            <a:fillRect/>
+          </a:stretch>
+        </p:blipFill>
+        <p:spPr>
+          <a:xfrm>
+            <a:off x="2209800" y="3764235"/>
+            <a:ext cx="7772400" cy="2482676"/>
+          </a:xfrm>
+          <a:prstGeom prst="rect">
+            <a:avLst/>
+          </a:prstGeom>
+        </p:spPr>
+      </p:pic>
+    </p:spTree>
+    <p:extLst>
+      <p:ext uri="{BB962C8B-B14F-4D97-AF65-F5344CB8AC3E}">
+        <p14:creationId xmlns:p14="http://schemas.microsoft.com/office/powerpoint/2010/main" val="1618280676"/>
+      </p:ext>
+    </p:extLst>
+  </p:cSld>
+  <p:clrMapOvr>
+    <a:masterClrMapping/>
+  </p:clrMapOvr>
+</p:sld>
+</file>
+
 <file path=ppt/slides/slide2.xml><?xml version="1.0" encoding="utf-8"?>
 <p:sld xmlns:a="http://schemas.openxmlformats.org/drawingml/2006/main" xmlns:r="http://schemas.openxmlformats.org/officeDocument/2006/relationships" xmlns:p="http://schemas.openxmlformats.org/presentationml/2006/main">
   <p:cSld>

</xml_diff>

<commit_message>
feat: add SOL letters to presentation
</commit_message>
<xml_diff>
--- a/Prezentacia.pptx
+++ b/Prezentacia.pptx
@@ -23,6 +23,15 @@
     <p:sldId id="271" r:id="rId17"/>
     <p:sldId id="273" r:id="rId18"/>
     <p:sldId id="272" r:id="rId19"/>
+    <p:sldId id="275" r:id="rId20"/>
+    <p:sldId id="276" r:id="rId21"/>
+    <p:sldId id="277" r:id="rId22"/>
+    <p:sldId id="278" r:id="rId23"/>
+    <p:sldId id="279" r:id="rId24"/>
+    <p:sldId id="281" r:id="rId25"/>
+    <p:sldId id="282" r:id="rId26"/>
+    <p:sldId id="284" r:id="rId27"/>
+    <p:sldId id="283" r:id="rId28"/>
   </p:sldIdLst>
   <p:sldSz cx="12192000" cy="6858000"/>
   <p:notesSz cx="6858000" cy="9144000"/>
@@ -278,7 +287,7 @@
           <a:p>
             <a:fld id="{1595C0F1-D55A-914C-B75E-24AFA456FADE}" type="datetimeFigureOut">
               <a:rPr lang="en-SK" smtClean="0"/>
-              <a:t>10/09/2022</a:t>
+              <a:t>10/11/2022</a:t>
             </a:fld>
             <a:endParaRPr lang="en-SK"/>
           </a:p>
@@ -478,7 +487,7 @@
           <a:p>
             <a:fld id="{1595C0F1-D55A-914C-B75E-24AFA456FADE}" type="datetimeFigureOut">
               <a:rPr lang="en-SK" smtClean="0"/>
-              <a:t>10/09/2022</a:t>
+              <a:t>10/11/2022</a:t>
             </a:fld>
             <a:endParaRPr lang="en-SK"/>
           </a:p>
@@ -688,7 +697,7 @@
           <a:p>
             <a:fld id="{1595C0F1-D55A-914C-B75E-24AFA456FADE}" type="datetimeFigureOut">
               <a:rPr lang="en-SK" smtClean="0"/>
-              <a:t>10/09/2022</a:t>
+              <a:t>10/11/2022</a:t>
             </a:fld>
             <a:endParaRPr lang="en-SK"/>
           </a:p>
@@ -888,7 +897,7 @@
           <a:p>
             <a:fld id="{1595C0F1-D55A-914C-B75E-24AFA456FADE}" type="datetimeFigureOut">
               <a:rPr lang="en-SK" smtClean="0"/>
-              <a:t>10/09/2022</a:t>
+              <a:t>10/11/2022</a:t>
             </a:fld>
             <a:endParaRPr lang="en-SK"/>
           </a:p>
@@ -1164,7 +1173,7 @@
           <a:p>
             <a:fld id="{1595C0F1-D55A-914C-B75E-24AFA456FADE}" type="datetimeFigureOut">
               <a:rPr lang="en-SK" smtClean="0"/>
-              <a:t>10/09/2022</a:t>
+              <a:t>10/11/2022</a:t>
             </a:fld>
             <a:endParaRPr lang="en-SK"/>
           </a:p>
@@ -1432,7 +1441,7 @@
           <a:p>
             <a:fld id="{1595C0F1-D55A-914C-B75E-24AFA456FADE}" type="datetimeFigureOut">
               <a:rPr lang="en-SK" smtClean="0"/>
-              <a:t>10/09/2022</a:t>
+              <a:t>10/11/2022</a:t>
             </a:fld>
             <a:endParaRPr lang="en-SK"/>
           </a:p>
@@ -1847,7 +1856,7 @@
           <a:p>
             <a:fld id="{1595C0F1-D55A-914C-B75E-24AFA456FADE}" type="datetimeFigureOut">
               <a:rPr lang="en-SK" smtClean="0"/>
-              <a:t>10/09/2022</a:t>
+              <a:t>10/11/2022</a:t>
             </a:fld>
             <a:endParaRPr lang="en-SK"/>
           </a:p>
@@ -1989,7 +1998,7 @@
           <a:p>
             <a:fld id="{1595C0F1-D55A-914C-B75E-24AFA456FADE}" type="datetimeFigureOut">
               <a:rPr lang="en-SK" smtClean="0"/>
-              <a:t>10/09/2022</a:t>
+              <a:t>10/11/2022</a:t>
             </a:fld>
             <a:endParaRPr lang="en-SK"/>
           </a:p>
@@ -2102,7 +2111,7 @@
           <a:p>
             <a:fld id="{1595C0F1-D55A-914C-B75E-24AFA456FADE}" type="datetimeFigureOut">
               <a:rPr lang="en-SK" smtClean="0"/>
-              <a:t>10/09/2022</a:t>
+              <a:t>10/11/2022</a:t>
             </a:fld>
             <a:endParaRPr lang="en-SK"/>
           </a:p>
@@ -2415,7 +2424,7 @@
           <a:p>
             <a:fld id="{1595C0F1-D55A-914C-B75E-24AFA456FADE}" type="datetimeFigureOut">
               <a:rPr lang="en-SK" smtClean="0"/>
-              <a:t>10/09/2022</a:t>
+              <a:t>10/11/2022</a:t>
             </a:fld>
             <a:endParaRPr lang="en-SK"/>
           </a:p>
@@ -2704,7 +2713,7 @@
           <a:p>
             <a:fld id="{1595C0F1-D55A-914C-B75E-24AFA456FADE}" type="datetimeFigureOut">
               <a:rPr lang="en-SK" smtClean="0"/>
-              <a:t>10/09/2022</a:t>
+              <a:t>10/11/2022</a:t>
             </a:fld>
             <a:endParaRPr lang="en-SK"/>
           </a:p>
@@ -2947,7 +2956,7 @@
           <a:p>
             <a:fld id="{1595C0F1-D55A-914C-B75E-24AFA456FADE}" type="datetimeFigureOut">
               <a:rPr lang="en-SK" smtClean="0"/>
-              <a:t>10/09/2022</a:t>
+              <a:t>10/11/2022</a:t>
             </a:fld>
             <a:endParaRPr lang="en-SK"/>
           </a:p>
@@ -4734,6 +4743,83 @@
 </p:sld>
 </file>
 
+<file path=ppt/slides/slide19.xml><?xml version="1.0" encoding="utf-8"?>
+<p:sld xmlns:a="http://schemas.openxmlformats.org/drawingml/2006/main" xmlns:r="http://schemas.openxmlformats.org/officeDocument/2006/relationships" xmlns:p="http://schemas.openxmlformats.org/presentationml/2006/main">
+  <p:cSld>
+    <p:spTree>
+      <p:nvGrpSpPr>
+        <p:cNvPr id="1" name=""/>
+        <p:cNvGrpSpPr/>
+        <p:nvPr/>
+      </p:nvGrpSpPr>
+      <p:grpSpPr>
+        <a:xfrm>
+          <a:off x="0" y="0"/>
+          <a:ext cx="0" cy="0"/>
+          <a:chOff x="0" y="0"/>
+          <a:chExt cx="0" cy="0"/>
+        </a:xfrm>
+      </p:grpSpPr>
+      <p:pic>
+        <p:nvPicPr>
+          <p:cNvPr id="1026" name="Picture 2" descr="SOLID Principles: How to create a code that is easy to extend and maintain-  Part 1 | Thoughtworks">
+            <a:extLst>
+              <a:ext uri="{FF2B5EF4-FFF2-40B4-BE49-F238E27FC236}">
+                <a16:creationId xmlns:a16="http://schemas.microsoft.com/office/drawing/2014/main" id="{0CB33EDE-9A09-552C-CD63-FD0A61C9B6EE}"/>
+              </a:ext>
+            </a:extLst>
+          </p:cNvPr>
+          <p:cNvPicPr>
+            <a:picLocks noChangeAspect="1" noChangeArrowheads="1"/>
+          </p:cNvPicPr>
+          <p:nvPr/>
+        </p:nvPicPr>
+        <p:blipFill>
+          <a:blip r:embed="rId2">
+            <a:extLst>
+              <a:ext uri="{28A0092B-C50C-407E-A947-70E740481C1C}">
+                <a14:useLocalDpi xmlns:a14="http://schemas.microsoft.com/office/drawing/2010/main" val="0"/>
+              </a:ext>
+            </a:extLst>
+          </a:blip>
+          <a:srcRect/>
+          <a:stretch>
+            <a:fillRect/>
+          </a:stretch>
+        </p:blipFill>
+        <p:spPr bwMode="auto">
+          <a:xfrm>
+            <a:off x="462224" y="1527162"/>
+            <a:ext cx="11267552" cy="3226217"/>
+          </a:xfrm>
+          <a:prstGeom prst="rect">
+            <a:avLst/>
+          </a:prstGeom>
+          <a:noFill/>
+          <a:extLst>
+            <a:ext uri="{909E8E84-426E-40DD-AFC4-6F175D3DCCD1}">
+              <a14:hiddenFill xmlns:a14="http://schemas.microsoft.com/office/drawing/2010/main">
+                <a:solidFill>
+                  <a:srgbClr val="FFFFFF"/>
+                </a:solidFill>
+              </a14:hiddenFill>
+            </a:ext>
+          </a:extLst>
+        </p:spPr>
+      </p:pic>
+    </p:spTree>
+    <p:extLst>
+      <p:ext uri="{BB962C8B-B14F-4D97-AF65-F5344CB8AC3E}">
+        <p14:creationId xmlns:p14="http://schemas.microsoft.com/office/powerpoint/2010/main" val="366327564"/>
+      </p:ext>
+    </p:extLst>
+  </p:cSld>
+  <p:clrMapOvr>
+    <a:masterClrMapping/>
+  </p:clrMapOvr>
+</p:sld>
+</file>
+
 <file path=ppt/slides/slide2.xml><?xml version="1.0" encoding="utf-8"?>
 <p:sld xmlns:a="http://schemas.openxmlformats.org/drawingml/2006/main" xmlns:r="http://schemas.openxmlformats.org/officeDocument/2006/relationships" xmlns:p="http://schemas.openxmlformats.org/presentationml/2006/main">
   <p:cSld>
@@ -4832,6 +4918,1129 @@
     <p:extLst>
       <p:ext uri="{BB962C8B-B14F-4D97-AF65-F5344CB8AC3E}">
         <p14:creationId xmlns:p14="http://schemas.microsoft.com/office/powerpoint/2010/main" val="2830885028"/>
+      </p:ext>
+    </p:extLst>
+  </p:cSld>
+  <p:clrMapOvr>
+    <a:masterClrMapping/>
+  </p:clrMapOvr>
+</p:sld>
+</file>
+
+<file path=ppt/slides/slide20.xml><?xml version="1.0" encoding="utf-8"?>
+<p:sld xmlns:a="http://schemas.openxmlformats.org/drawingml/2006/main" xmlns:r="http://schemas.openxmlformats.org/officeDocument/2006/relationships" xmlns:p="http://schemas.openxmlformats.org/presentationml/2006/main">
+  <p:cSld>
+    <p:spTree>
+      <p:nvGrpSpPr>
+        <p:cNvPr id="1" name=""/>
+        <p:cNvGrpSpPr/>
+        <p:nvPr/>
+      </p:nvGrpSpPr>
+      <p:grpSpPr>
+        <a:xfrm>
+          <a:off x="0" y="0"/>
+          <a:ext cx="0" cy="0"/>
+          <a:chOff x="0" y="0"/>
+          <a:chExt cx="0" cy="0"/>
+        </a:xfrm>
+      </p:grpSpPr>
+      <p:sp>
+        <p:nvSpPr>
+          <p:cNvPr id="2" name="Nadpis 1">
+            <a:extLst>
+              <a:ext uri="{FF2B5EF4-FFF2-40B4-BE49-F238E27FC236}">
+                <a16:creationId xmlns:a16="http://schemas.microsoft.com/office/drawing/2014/main" id="{1070F7F6-D207-39CE-56AC-1BEB8FC077A5}"/>
+              </a:ext>
+            </a:extLst>
+          </p:cNvPr>
+          <p:cNvSpPr>
+            <a:spLocks noGrp="1"/>
+          </p:cNvSpPr>
+          <p:nvPr>
+            <p:ph type="title"/>
+          </p:nvPr>
+        </p:nvSpPr>
+        <p:spPr/>
+        <p:txBody>
+          <a:bodyPr/>
+          <a:lstStyle/>
+          <a:p>
+            <a:r>
+              <a:rPr lang="sk-SK" sz="5400" b="1" dirty="0"/>
+              <a:t>S</a:t>
+            </a:r>
+            <a:r>
+              <a:rPr lang="sk-SK" dirty="0"/>
+              <a:t>ingle </a:t>
+            </a:r>
+            <a:r>
+              <a:rPr lang="sk-SK" dirty="0" err="1"/>
+              <a:t>Responsibility</a:t>
+            </a:r>
+            <a:r>
+              <a:rPr lang="sk-SK" dirty="0"/>
+              <a:t> </a:t>
+            </a:r>
+            <a:r>
+              <a:rPr lang="sk-SK" dirty="0" err="1"/>
+              <a:t>Principle</a:t>
+            </a:r>
+            <a:endParaRPr lang="sk-SK" dirty="0"/>
+          </a:p>
+        </p:txBody>
+      </p:sp>
+      <p:pic>
+        <p:nvPicPr>
+          <p:cNvPr id="5" name="Obrázok 4">
+            <a:extLst>
+              <a:ext uri="{FF2B5EF4-FFF2-40B4-BE49-F238E27FC236}">
+                <a16:creationId xmlns:a16="http://schemas.microsoft.com/office/drawing/2014/main" id="{BDDBE175-29F3-57F3-7801-E14F1DE7D364}"/>
+              </a:ext>
+            </a:extLst>
+          </p:cNvPr>
+          <p:cNvPicPr>
+            <a:picLocks noChangeAspect="1"/>
+          </p:cNvPicPr>
+          <p:nvPr/>
+        </p:nvPicPr>
+        <p:blipFill>
+          <a:blip r:embed="rId2"/>
+          <a:stretch>
+            <a:fillRect/>
+          </a:stretch>
+        </p:blipFill>
+        <p:spPr>
+          <a:xfrm>
+            <a:off x="2332119" y="1551339"/>
+            <a:ext cx="5706562" cy="4812875"/>
+          </a:xfrm>
+          <a:prstGeom prst="rect">
+            <a:avLst/>
+          </a:prstGeom>
+        </p:spPr>
+      </p:pic>
+    </p:spTree>
+    <p:extLst>
+      <p:ext uri="{BB962C8B-B14F-4D97-AF65-F5344CB8AC3E}">
+        <p14:creationId xmlns:p14="http://schemas.microsoft.com/office/powerpoint/2010/main" val="3346236091"/>
+      </p:ext>
+    </p:extLst>
+  </p:cSld>
+  <p:clrMapOvr>
+    <a:masterClrMapping/>
+  </p:clrMapOvr>
+</p:sld>
+</file>
+
+<file path=ppt/slides/slide21.xml><?xml version="1.0" encoding="utf-8"?>
+<p:sld xmlns:a="http://schemas.openxmlformats.org/drawingml/2006/main" xmlns:r="http://schemas.openxmlformats.org/officeDocument/2006/relationships" xmlns:p="http://schemas.openxmlformats.org/presentationml/2006/main">
+  <p:cSld>
+    <p:spTree>
+      <p:nvGrpSpPr>
+        <p:cNvPr id="1" name=""/>
+        <p:cNvGrpSpPr/>
+        <p:nvPr/>
+      </p:nvGrpSpPr>
+      <p:grpSpPr>
+        <a:xfrm>
+          <a:off x="0" y="0"/>
+          <a:ext cx="0" cy="0"/>
+          <a:chOff x="0" y="0"/>
+          <a:chExt cx="0" cy="0"/>
+        </a:xfrm>
+      </p:grpSpPr>
+      <p:sp>
+        <p:nvSpPr>
+          <p:cNvPr id="2" name="Nadpis 1">
+            <a:extLst>
+              <a:ext uri="{FF2B5EF4-FFF2-40B4-BE49-F238E27FC236}">
+                <a16:creationId xmlns:a16="http://schemas.microsoft.com/office/drawing/2014/main" id="{C0AE11D4-7E24-9DA3-718B-0F6405974732}"/>
+              </a:ext>
+            </a:extLst>
+          </p:cNvPr>
+          <p:cNvSpPr>
+            <a:spLocks noGrp="1"/>
+          </p:cNvSpPr>
+          <p:nvPr>
+            <p:ph type="title"/>
+          </p:nvPr>
+        </p:nvSpPr>
+        <p:spPr/>
+        <p:txBody>
+          <a:bodyPr/>
+          <a:lstStyle/>
+          <a:p>
+            <a:endParaRPr lang="sk-SK"/>
+          </a:p>
+        </p:txBody>
+      </p:sp>
+      <p:sp>
+        <p:nvSpPr>
+          <p:cNvPr id="3" name="Zástupný objekt pre obsah 2">
+            <a:extLst>
+              <a:ext uri="{FF2B5EF4-FFF2-40B4-BE49-F238E27FC236}">
+                <a16:creationId xmlns:a16="http://schemas.microsoft.com/office/drawing/2014/main" id="{7A5B09CD-97C9-E99F-994F-6C7E51B50224}"/>
+              </a:ext>
+            </a:extLst>
+          </p:cNvPr>
+          <p:cNvSpPr>
+            <a:spLocks noGrp="1"/>
+          </p:cNvSpPr>
+          <p:nvPr>
+            <p:ph idx="1"/>
+          </p:nvPr>
+        </p:nvSpPr>
+        <p:spPr/>
+        <p:txBody>
+          <a:bodyPr/>
+          <a:lstStyle/>
+          <a:p>
+            <a:endParaRPr lang="sk-SK"/>
+          </a:p>
+        </p:txBody>
+      </p:sp>
+      <p:pic>
+        <p:nvPicPr>
+          <p:cNvPr id="5" name="Obrázok 4">
+            <a:extLst>
+              <a:ext uri="{FF2B5EF4-FFF2-40B4-BE49-F238E27FC236}">
+                <a16:creationId xmlns:a16="http://schemas.microsoft.com/office/drawing/2014/main" id="{F8A82972-F9FD-E9C0-F29F-73EF02108AF6}"/>
+              </a:ext>
+            </a:extLst>
+          </p:cNvPr>
+          <p:cNvPicPr>
+            <a:picLocks noChangeAspect="1"/>
+          </p:cNvPicPr>
+          <p:nvPr/>
+        </p:nvPicPr>
+        <p:blipFill>
+          <a:blip r:embed="rId2"/>
+          <a:stretch>
+            <a:fillRect/>
+          </a:stretch>
+        </p:blipFill>
+        <p:spPr>
+          <a:xfrm>
+            <a:off x="502419" y="364229"/>
+            <a:ext cx="5297734" cy="4335376"/>
+          </a:xfrm>
+          <a:prstGeom prst="rect">
+            <a:avLst/>
+          </a:prstGeom>
+        </p:spPr>
+      </p:pic>
+      <p:pic>
+        <p:nvPicPr>
+          <p:cNvPr id="7" name="Obrázok 6">
+            <a:extLst>
+              <a:ext uri="{FF2B5EF4-FFF2-40B4-BE49-F238E27FC236}">
+                <a16:creationId xmlns:a16="http://schemas.microsoft.com/office/drawing/2014/main" id="{73B7EE1E-E10E-CC81-DF19-8B27A83650BA}"/>
+              </a:ext>
+            </a:extLst>
+          </p:cNvPr>
+          <p:cNvPicPr>
+            <a:picLocks noChangeAspect="1"/>
+          </p:cNvPicPr>
+          <p:nvPr/>
+        </p:nvPicPr>
+        <p:blipFill>
+          <a:blip r:embed="rId3"/>
+          <a:stretch>
+            <a:fillRect/>
+          </a:stretch>
+        </p:blipFill>
+        <p:spPr>
+          <a:xfrm>
+            <a:off x="6095999" y="365125"/>
+            <a:ext cx="5772956" cy="4039164"/>
+          </a:xfrm>
+          <a:prstGeom prst="rect">
+            <a:avLst/>
+          </a:prstGeom>
+        </p:spPr>
+      </p:pic>
+      <p:pic>
+        <p:nvPicPr>
+          <p:cNvPr id="9" name="Obrázok 8">
+            <a:extLst>
+              <a:ext uri="{FF2B5EF4-FFF2-40B4-BE49-F238E27FC236}">
+                <a16:creationId xmlns:a16="http://schemas.microsoft.com/office/drawing/2014/main" id="{8AC1360F-CED6-705E-0ACF-7A199EE581E8}"/>
+              </a:ext>
+            </a:extLst>
+          </p:cNvPr>
+          <p:cNvPicPr>
+            <a:picLocks noChangeAspect="1"/>
+          </p:cNvPicPr>
+          <p:nvPr/>
+        </p:nvPicPr>
+        <p:blipFill>
+          <a:blip r:embed="rId4"/>
+          <a:stretch>
+            <a:fillRect/>
+          </a:stretch>
+        </p:blipFill>
+        <p:spPr>
+          <a:xfrm>
+            <a:off x="1794862" y="5149663"/>
+            <a:ext cx="8602275" cy="1343212"/>
+          </a:xfrm>
+          <a:prstGeom prst="rect">
+            <a:avLst/>
+          </a:prstGeom>
+        </p:spPr>
+      </p:pic>
+    </p:spTree>
+    <p:extLst>
+      <p:ext uri="{BB962C8B-B14F-4D97-AF65-F5344CB8AC3E}">
+        <p14:creationId xmlns:p14="http://schemas.microsoft.com/office/powerpoint/2010/main" val="1829298268"/>
+      </p:ext>
+    </p:extLst>
+  </p:cSld>
+  <p:clrMapOvr>
+    <a:masterClrMapping/>
+  </p:clrMapOvr>
+</p:sld>
+</file>
+
+<file path=ppt/slides/slide22.xml><?xml version="1.0" encoding="utf-8"?>
+<p:sld xmlns:a="http://schemas.openxmlformats.org/drawingml/2006/main" xmlns:r="http://schemas.openxmlformats.org/officeDocument/2006/relationships" xmlns:p="http://schemas.openxmlformats.org/presentationml/2006/main">
+  <p:cSld>
+    <p:spTree>
+      <p:nvGrpSpPr>
+        <p:cNvPr id="1" name=""/>
+        <p:cNvGrpSpPr/>
+        <p:nvPr/>
+      </p:nvGrpSpPr>
+      <p:grpSpPr>
+        <a:xfrm>
+          <a:off x="0" y="0"/>
+          <a:ext cx="0" cy="0"/>
+          <a:chOff x="0" y="0"/>
+          <a:chExt cx="0" cy="0"/>
+        </a:xfrm>
+      </p:grpSpPr>
+      <p:sp>
+        <p:nvSpPr>
+          <p:cNvPr id="2" name="Nadpis 1">
+            <a:extLst>
+              <a:ext uri="{FF2B5EF4-FFF2-40B4-BE49-F238E27FC236}">
+                <a16:creationId xmlns:a16="http://schemas.microsoft.com/office/drawing/2014/main" id="{19853EBF-75A2-2B30-2359-674EFEDA1E24}"/>
+              </a:ext>
+            </a:extLst>
+          </p:cNvPr>
+          <p:cNvSpPr>
+            <a:spLocks noGrp="1"/>
+          </p:cNvSpPr>
+          <p:nvPr>
+            <p:ph type="title"/>
+          </p:nvPr>
+        </p:nvSpPr>
+        <p:spPr/>
+        <p:txBody>
+          <a:bodyPr/>
+          <a:lstStyle/>
+          <a:p>
+            <a:r>
+              <a:rPr lang="sk-SK" sz="5400" b="1" dirty="0" err="1"/>
+              <a:t>O</a:t>
+            </a:r>
+            <a:r>
+              <a:rPr lang="sk-SK" dirty="0" err="1"/>
+              <a:t>pen-Closed</a:t>
+            </a:r>
+            <a:r>
+              <a:rPr lang="sk-SK" dirty="0"/>
+              <a:t> </a:t>
+            </a:r>
+            <a:r>
+              <a:rPr lang="sk-SK" dirty="0" err="1"/>
+              <a:t>Principle</a:t>
+            </a:r>
+            <a:endParaRPr lang="sk-SK" dirty="0"/>
+          </a:p>
+        </p:txBody>
+      </p:sp>
+      <p:pic>
+        <p:nvPicPr>
+          <p:cNvPr id="5" name="Zástupný objekt pre obsah 4">
+            <a:extLst>
+              <a:ext uri="{FF2B5EF4-FFF2-40B4-BE49-F238E27FC236}">
+                <a16:creationId xmlns:a16="http://schemas.microsoft.com/office/drawing/2014/main" id="{E0893908-A0C7-4439-916A-69162050F638}"/>
+              </a:ext>
+            </a:extLst>
+          </p:cNvPr>
+          <p:cNvPicPr>
+            <a:picLocks noGrp="1" noChangeAspect="1"/>
+          </p:cNvPicPr>
+          <p:nvPr>
+            <p:ph idx="1"/>
+          </p:nvPr>
+        </p:nvPicPr>
+        <p:blipFill>
+          <a:blip r:embed="rId2"/>
+          <a:stretch>
+            <a:fillRect/>
+          </a:stretch>
+        </p:blipFill>
+        <p:spPr>
+          <a:xfrm>
+            <a:off x="6631911" y="1690688"/>
+            <a:ext cx="5466867" cy="3956387"/>
+          </a:xfrm>
+        </p:spPr>
+      </p:pic>
+      <p:pic>
+        <p:nvPicPr>
+          <p:cNvPr id="7" name="Obrázok 6">
+            <a:extLst>
+              <a:ext uri="{FF2B5EF4-FFF2-40B4-BE49-F238E27FC236}">
+                <a16:creationId xmlns:a16="http://schemas.microsoft.com/office/drawing/2014/main" id="{1935C28A-6D93-F72F-435B-00C7E1F818CC}"/>
+              </a:ext>
+            </a:extLst>
+          </p:cNvPr>
+          <p:cNvPicPr>
+            <a:picLocks noChangeAspect="1"/>
+          </p:cNvPicPr>
+          <p:nvPr/>
+        </p:nvPicPr>
+        <p:blipFill>
+          <a:blip r:embed="rId3"/>
+          <a:stretch>
+            <a:fillRect/>
+          </a:stretch>
+        </p:blipFill>
+        <p:spPr>
+          <a:xfrm>
+            <a:off x="93222" y="1923700"/>
+            <a:ext cx="6458304" cy="3490362"/>
+          </a:xfrm>
+          <a:prstGeom prst="rect">
+            <a:avLst/>
+          </a:prstGeom>
+        </p:spPr>
+      </p:pic>
+    </p:spTree>
+    <p:extLst>
+      <p:ext uri="{BB962C8B-B14F-4D97-AF65-F5344CB8AC3E}">
+        <p14:creationId xmlns:p14="http://schemas.microsoft.com/office/powerpoint/2010/main" val="370574663"/>
+      </p:ext>
+    </p:extLst>
+  </p:cSld>
+  <p:clrMapOvr>
+    <a:masterClrMapping/>
+  </p:clrMapOvr>
+</p:sld>
+</file>
+
+<file path=ppt/slides/slide23.xml><?xml version="1.0" encoding="utf-8"?>
+<p:sld xmlns:a="http://schemas.openxmlformats.org/drawingml/2006/main" xmlns:r="http://schemas.openxmlformats.org/officeDocument/2006/relationships" xmlns:p="http://schemas.openxmlformats.org/presentationml/2006/main">
+  <p:cSld>
+    <p:spTree>
+      <p:nvGrpSpPr>
+        <p:cNvPr id="1" name=""/>
+        <p:cNvGrpSpPr/>
+        <p:nvPr/>
+      </p:nvGrpSpPr>
+      <p:grpSpPr>
+        <a:xfrm>
+          <a:off x="0" y="0"/>
+          <a:ext cx="0" cy="0"/>
+          <a:chOff x="0" y="0"/>
+          <a:chExt cx="0" cy="0"/>
+        </a:xfrm>
+      </p:grpSpPr>
+      <p:pic>
+        <p:nvPicPr>
+          <p:cNvPr id="5" name="Zástupný objekt pre obsah 4">
+            <a:extLst>
+              <a:ext uri="{FF2B5EF4-FFF2-40B4-BE49-F238E27FC236}">
+                <a16:creationId xmlns:a16="http://schemas.microsoft.com/office/drawing/2014/main" id="{116317BF-ED18-FB41-C995-FC1BEBEDD4EF}"/>
+              </a:ext>
+            </a:extLst>
+          </p:cNvPr>
+          <p:cNvPicPr>
+            <a:picLocks noGrp="1" noChangeAspect="1"/>
+          </p:cNvPicPr>
+          <p:nvPr>
+            <p:ph idx="1"/>
+          </p:nvPr>
+        </p:nvPicPr>
+        <p:blipFill>
+          <a:blip r:embed="rId2"/>
+          <a:stretch>
+            <a:fillRect/>
+          </a:stretch>
+        </p:blipFill>
+        <p:spPr>
+          <a:xfrm>
+            <a:off x="88666" y="593658"/>
+            <a:ext cx="5142735" cy="3978342"/>
+          </a:xfrm>
+        </p:spPr>
+      </p:pic>
+      <p:pic>
+        <p:nvPicPr>
+          <p:cNvPr id="8" name="Obrázok 7">
+            <a:extLst>
+              <a:ext uri="{FF2B5EF4-FFF2-40B4-BE49-F238E27FC236}">
+                <a16:creationId xmlns:a16="http://schemas.microsoft.com/office/drawing/2014/main" id="{448FEB1E-8DD4-4B30-096C-5882888EFD1F}"/>
+              </a:ext>
+            </a:extLst>
+          </p:cNvPr>
+          <p:cNvPicPr>
+            <a:picLocks noChangeAspect="1"/>
+          </p:cNvPicPr>
+          <p:nvPr/>
+        </p:nvPicPr>
+        <p:blipFill>
+          <a:blip r:embed="rId3"/>
+          <a:stretch>
+            <a:fillRect/>
+          </a:stretch>
+        </p:blipFill>
+        <p:spPr>
+          <a:xfrm>
+            <a:off x="5285433" y="714666"/>
+            <a:ext cx="6796035" cy="3553956"/>
+          </a:xfrm>
+          <a:prstGeom prst="rect">
+            <a:avLst/>
+          </a:prstGeom>
+        </p:spPr>
+      </p:pic>
+      <p:pic>
+        <p:nvPicPr>
+          <p:cNvPr id="10" name="Obrázok 9">
+            <a:extLst>
+              <a:ext uri="{FF2B5EF4-FFF2-40B4-BE49-F238E27FC236}">
+                <a16:creationId xmlns:a16="http://schemas.microsoft.com/office/drawing/2014/main" id="{409B8143-0154-72F5-2FE4-C05A29CFC033}"/>
+              </a:ext>
+            </a:extLst>
+          </p:cNvPr>
+          <p:cNvPicPr>
+            <a:picLocks noChangeAspect="1"/>
+          </p:cNvPicPr>
+          <p:nvPr/>
+        </p:nvPicPr>
+        <p:blipFill>
+          <a:blip r:embed="rId4"/>
+          <a:stretch>
+            <a:fillRect/>
+          </a:stretch>
+        </p:blipFill>
+        <p:spPr>
+          <a:xfrm>
+            <a:off x="1405000" y="4666951"/>
+            <a:ext cx="8859486" cy="1676634"/>
+          </a:xfrm>
+          <a:prstGeom prst="rect">
+            <a:avLst/>
+          </a:prstGeom>
+        </p:spPr>
+      </p:pic>
+    </p:spTree>
+    <p:extLst>
+      <p:ext uri="{BB962C8B-B14F-4D97-AF65-F5344CB8AC3E}">
+        <p14:creationId xmlns:p14="http://schemas.microsoft.com/office/powerpoint/2010/main" val="1712191212"/>
+      </p:ext>
+    </p:extLst>
+  </p:cSld>
+  <p:clrMapOvr>
+    <a:masterClrMapping/>
+  </p:clrMapOvr>
+</p:sld>
+</file>
+
+<file path=ppt/slides/slide24.xml><?xml version="1.0" encoding="utf-8"?>
+<p:sld xmlns:a="http://schemas.openxmlformats.org/drawingml/2006/main" xmlns:r="http://schemas.openxmlformats.org/officeDocument/2006/relationships" xmlns:p="http://schemas.openxmlformats.org/presentationml/2006/main">
+  <p:cSld>
+    <p:spTree>
+      <p:nvGrpSpPr>
+        <p:cNvPr id="1" name=""/>
+        <p:cNvGrpSpPr/>
+        <p:nvPr/>
+      </p:nvGrpSpPr>
+      <p:grpSpPr>
+        <a:xfrm>
+          <a:off x="0" y="0"/>
+          <a:ext cx="0" cy="0"/>
+          <a:chOff x="0" y="0"/>
+          <a:chExt cx="0" cy="0"/>
+        </a:xfrm>
+      </p:grpSpPr>
+      <p:sp>
+        <p:nvSpPr>
+          <p:cNvPr id="2" name="Nadpis 1">
+            <a:extLst>
+              <a:ext uri="{FF2B5EF4-FFF2-40B4-BE49-F238E27FC236}">
+                <a16:creationId xmlns:a16="http://schemas.microsoft.com/office/drawing/2014/main" id="{9DCB58B8-663D-47D9-BB27-CBD265ADD44E}"/>
+              </a:ext>
+            </a:extLst>
+          </p:cNvPr>
+          <p:cNvSpPr>
+            <a:spLocks noGrp="1"/>
+          </p:cNvSpPr>
+          <p:nvPr>
+            <p:ph type="title"/>
+          </p:nvPr>
+        </p:nvSpPr>
+        <p:spPr/>
+        <p:txBody>
+          <a:bodyPr/>
+          <a:lstStyle/>
+          <a:p>
+            <a:r>
+              <a:rPr lang="sk-SK" sz="5400" b="1" dirty="0" err="1"/>
+              <a:t>L</a:t>
+            </a:r>
+            <a:r>
+              <a:rPr lang="sk-SK" dirty="0" err="1"/>
+              <a:t>iskov</a:t>
+            </a:r>
+            <a:r>
+              <a:rPr lang="sk-SK" dirty="0"/>
+              <a:t> </a:t>
+            </a:r>
+            <a:r>
+              <a:rPr lang="sk-SK" dirty="0" err="1"/>
+              <a:t>Substitution</a:t>
+            </a:r>
+            <a:r>
+              <a:rPr lang="sk-SK" dirty="0"/>
+              <a:t> </a:t>
+            </a:r>
+            <a:r>
+              <a:rPr lang="sk-SK" dirty="0" err="1"/>
+              <a:t>Principle</a:t>
+            </a:r>
+            <a:endParaRPr lang="sk-SK" dirty="0"/>
+          </a:p>
+        </p:txBody>
+      </p:sp>
+      <p:pic>
+        <p:nvPicPr>
+          <p:cNvPr id="4" name="Obrázok 3" descr="Obrázok, na ktorom je text&#10;&#10;Automaticky generovaný popis">
+            <a:extLst>
+              <a:ext uri="{FF2B5EF4-FFF2-40B4-BE49-F238E27FC236}">
+                <a16:creationId xmlns:a16="http://schemas.microsoft.com/office/drawing/2014/main" id="{83EF88B5-017D-FF9B-37B2-84FA48513597}"/>
+              </a:ext>
+            </a:extLst>
+          </p:cNvPr>
+          <p:cNvPicPr>
+            <a:picLocks noChangeAspect="1"/>
+          </p:cNvPicPr>
+          <p:nvPr/>
+        </p:nvPicPr>
+        <p:blipFill>
+          <a:blip r:embed="rId2">
+            <a:extLst>
+              <a:ext uri="{28A0092B-C50C-407E-A947-70E740481C1C}">
+                <a14:useLocalDpi xmlns:a14="http://schemas.microsoft.com/office/drawing/2010/main" val="0"/>
+              </a:ext>
+            </a:extLst>
+          </a:blip>
+          <a:srcRect/>
+          <a:stretch>
+            <a:fillRect/>
+          </a:stretch>
+        </p:blipFill>
+        <p:spPr bwMode="auto">
+          <a:xfrm>
+            <a:off x="321169" y="1785585"/>
+            <a:ext cx="6278487" cy="2495166"/>
+          </a:xfrm>
+          <a:prstGeom prst="rect">
+            <a:avLst/>
+          </a:prstGeom>
+          <a:noFill/>
+          <a:ln>
+            <a:noFill/>
+          </a:ln>
+        </p:spPr>
+      </p:pic>
+      <p:pic>
+        <p:nvPicPr>
+          <p:cNvPr id="5" name="Zástupný objekt pre obsah 4" descr="Obrázok, na ktorom je text&#10;&#10;Automaticky generovaný popis">
+            <a:extLst>
+              <a:ext uri="{FF2B5EF4-FFF2-40B4-BE49-F238E27FC236}">
+                <a16:creationId xmlns:a16="http://schemas.microsoft.com/office/drawing/2014/main" id="{5BA45697-8419-9169-6AB0-9D4486CEE4D3}"/>
+              </a:ext>
+            </a:extLst>
+          </p:cNvPr>
+          <p:cNvPicPr>
+            <a:picLocks noGrp="1" noChangeAspect="1"/>
+          </p:cNvPicPr>
+          <p:nvPr>
+            <p:ph idx="1"/>
+          </p:nvPr>
+        </p:nvPicPr>
+        <p:blipFill>
+          <a:blip r:embed="rId3">
+            <a:extLst>
+              <a:ext uri="{28A0092B-C50C-407E-A947-70E740481C1C}">
+                <a14:useLocalDpi xmlns:a14="http://schemas.microsoft.com/office/drawing/2010/main" val="0"/>
+              </a:ext>
+            </a:extLst>
+          </a:blip>
+          <a:srcRect/>
+          <a:stretch>
+            <a:fillRect/>
+          </a:stretch>
+        </p:blipFill>
+        <p:spPr bwMode="auto">
+          <a:xfrm>
+            <a:off x="6855398" y="1785585"/>
+            <a:ext cx="4781434" cy="2495166"/>
+          </a:xfrm>
+          <a:prstGeom prst="rect">
+            <a:avLst/>
+          </a:prstGeom>
+          <a:noFill/>
+          <a:ln>
+            <a:noFill/>
+          </a:ln>
+        </p:spPr>
+      </p:pic>
+      <p:pic>
+        <p:nvPicPr>
+          <p:cNvPr id="6" name="Obrázok 5" descr="Obrázok, na ktorom je text&#10;&#10;Automaticky generovaný popis">
+            <a:extLst>
+              <a:ext uri="{FF2B5EF4-FFF2-40B4-BE49-F238E27FC236}">
+                <a16:creationId xmlns:a16="http://schemas.microsoft.com/office/drawing/2014/main" id="{99332FB3-D0C9-E637-A8B4-BA88A9D731A0}"/>
+              </a:ext>
+            </a:extLst>
+          </p:cNvPr>
+          <p:cNvPicPr>
+            <a:picLocks noChangeAspect="1"/>
+          </p:cNvPicPr>
+          <p:nvPr/>
+        </p:nvPicPr>
+        <p:blipFill>
+          <a:blip r:embed="rId4">
+            <a:extLst>
+              <a:ext uri="{28A0092B-C50C-407E-A947-70E740481C1C}">
+                <a14:useLocalDpi xmlns:a14="http://schemas.microsoft.com/office/drawing/2010/main" val="0"/>
+              </a:ext>
+            </a:extLst>
+          </a:blip>
+          <a:srcRect/>
+          <a:stretch>
+            <a:fillRect/>
+          </a:stretch>
+        </p:blipFill>
+        <p:spPr bwMode="auto">
+          <a:xfrm>
+            <a:off x="2603776" y="4632314"/>
+            <a:ext cx="5322490" cy="1325563"/>
+          </a:xfrm>
+          <a:prstGeom prst="rect">
+            <a:avLst/>
+          </a:prstGeom>
+          <a:noFill/>
+          <a:ln>
+            <a:noFill/>
+          </a:ln>
+        </p:spPr>
+      </p:pic>
+    </p:spTree>
+    <p:extLst>
+      <p:ext uri="{BB962C8B-B14F-4D97-AF65-F5344CB8AC3E}">
+        <p14:creationId xmlns:p14="http://schemas.microsoft.com/office/powerpoint/2010/main" val="1308408443"/>
+      </p:ext>
+    </p:extLst>
+  </p:cSld>
+  <p:clrMapOvr>
+    <a:masterClrMapping/>
+  </p:clrMapOvr>
+</p:sld>
+</file>
+
+<file path=ppt/slides/slide25.xml><?xml version="1.0" encoding="utf-8"?>
+<p:sld xmlns:a="http://schemas.openxmlformats.org/drawingml/2006/main" xmlns:r="http://schemas.openxmlformats.org/officeDocument/2006/relationships" xmlns:p="http://schemas.openxmlformats.org/presentationml/2006/main">
+  <p:cSld>
+    <p:spTree>
+      <p:nvGrpSpPr>
+        <p:cNvPr id="1" name=""/>
+        <p:cNvGrpSpPr/>
+        <p:nvPr/>
+      </p:nvGrpSpPr>
+      <p:grpSpPr>
+        <a:xfrm>
+          <a:off x="0" y="0"/>
+          <a:ext cx="0" cy="0"/>
+          <a:chOff x="0" y="0"/>
+          <a:chExt cx="0" cy="0"/>
+        </a:xfrm>
+      </p:grpSpPr>
+      <p:sp>
+        <p:nvSpPr>
+          <p:cNvPr id="2" name="Nadpis 1">
+            <a:extLst>
+              <a:ext uri="{FF2B5EF4-FFF2-40B4-BE49-F238E27FC236}">
+                <a16:creationId xmlns:a16="http://schemas.microsoft.com/office/drawing/2014/main" id="{0AD2A3BD-9067-D654-D133-0C10620088CA}"/>
+              </a:ext>
+            </a:extLst>
+          </p:cNvPr>
+          <p:cNvSpPr>
+            <a:spLocks noGrp="1"/>
+          </p:cNvSpPr>
+          <p:nvPr>
+            <p:ph type="title"/>
+          </p:nvPr>
+        </p:nvSpPr>
+        <p:spPr/>
+        <p:txBody>
+          <a:bodyPr/>
+          <a:lstStyle/>
+          <a:p>
+            <a:r>
+              <a:rPr lang="sk-SK" sz="5400" b="1" dirty="0" err="1"/>
+              <a:t>L</a:t>
+            </a:r>
+            <a:r>
+              <a:rPr lang="sk-SK" dirty="0" err="1"/>
+              <a:t>iskov</a:t>
+            </a:r>
+            <a:r>
+              <a:rPr lang="sk-SK" dirty="0"/>
+              <a:t> </a:t>
+            </a:r>
+            <a:r>
+              <a:rPr lang="sk-SK" dirty="0" err="1"/>
+              <a:t>Substitution</a:t>
+            </a:r>
+            <a:r>
+              <a:rPr lang="sk-SK" dirty="0"/>
+              <a:t> </a:t>
+            </a:r>
+            <a:r>
+              <a:rPr lang="sk-SK" dirty="0" err="1"/>
+              <a:t>Principle</a:t>
+            </a:r>
+            <a:endParaRPr lang="sk-SK" dirty="0"/>
+          </a:p>
+        </p:txBody>
+      </p:sp>
+      <p:pic>
+        <p:nvPicPr>
+          <p:cNvPr id="7" name="Zástupný objekt pre obsah 6">
+            <a:extLst>
+              <a:ext uri="{FF2B5EF4-FFF2-40B4-BE49-F238E27FC236}">
+                <a16:creationId xmlns:a16="http://schemas.microsoft.com/office/drawing/2014/main" id="{3D7C44F8-9BF5-3FE9-24FF-3C6798C4DE5C}"/>
+              </a:ext>
+            </a:extLst>
+          </p:cNvPr>
+          <p:cNvPicPr>
+            <a:picLocks noGrp="1" noChangeAspect="1"/>
+          </p:cNvPicPr>
+          <p:nvPr>
+            <p:ph idx="1"/>
+          </p:nvPr>
+        </p:nvPicPr>
+        <p:blipFill>
+          <a:blip r:embed="rId2"/>
+          <a:stretch>
+            <a:fillRect/>
+          </a:stretch>
+        </p:blipFill>
+        <p:spPr>
+          <a:xfrm>
+            <a:off x="6207585" y="1619768"/>
+            <a:ext cx="4514006" cy="5238232"/>
+          </a:xfrm>
+        </p:spPr>
+      </p:pic>
+      <p:pic>
+        <p:nvPicPr>
+          <p:cNvPr id="5" name="Obrázok 4">
+            <a:extLst>
+              <a:ext uri="{FF2B5EF4-FFF2-40B4-BE49-F238E27FC236}">
+                <a16:creationId xmlns:a16="http://schemas.microsoft.com/office/drawing/2014/main" id="{C9620B7C-7B40-3F7A-14D3-70C180B8A9EE}"/>
+              </a:ext>
+            </a:extLst>
+          </p:cNvPr>
+          <p:cNvPicPr>
+            <a:picLocks noChangeAspect="1"/>
+          </p:cNvPicPr>
+          <p:nvPr/>
+        </p:nvPicPr>
+        <p:blipFill>
+          <a:blip r:embed="rId3"/>
+          <a:stretch>
+            <a:fillRect/>
+          </a:stretch>
+        </p:blipFill>
+        <p:spPr>
+          <a:xfrm>
+            <a:off x="1470409" y="2441749"/>
+            <a:ext cx="3925939" cy="2691767"/>
+          </a:xfrm>
+          <a:prstGeom prst="rect">
+            <a:avLst/>
+          </a:prstGeom>
+        </p:spPr>
+      </p:pic>
+    </p:spTree>
+    <p:extLst>
+      <p:ext uri="{BB962C8B-B14F-4D97-AF65-F5344CB8AC3E}">
+        <p14:creationId xmlns:p14="http://schemas.microsoft.com/office/powerpoint/2010/main" val="1594396830"/>
+      </p:ext>
+    </p:extLst>
+  </p:cSld>
+  <p:clrMapOvr>
+    <a:masterClrMapping/>
+  </p:clrMapOvr>
+</p:sld>
+</file>
+
+<file path=ppt/slides/slide26.xml><?xml version="1.0" encoding="utf-8"?>
+<p:sld xmlns:a="http://schemas.openxmlformats.org/drawingml/2006/main" xmlns:r="http://schemas.openxmlformats.org/officeDocument/2006/relationships" xmlns:p="http://schemas.openxmlformats.org/presentationml/2006/main">
+  <p:cSld>
+    <p:spTree>
+      <p:nvGrpSpPr>
+        <p:cNvPr id="1" name=""/>
+        <p:cNvGrpSpPr/>
+        <p:nvPr/>
+      </p:nvGrpSpPr>
+      <p:grpSpPr>
+        <a:xfrm>
+          <a:off x="0" y="0"/>
+          <a:ext cx="0" cy="0"/>
+          <a:chOff x="0" y="0"/>
+          <a:chExt cx="0" cy="0"/>
+        </a:xfrm>
+      </p:grpSpPr>
+      <p:sp>
+        <p:nvSpPr>
+          <p:cNvPr id="2" name="Nadpis 1">
+            <a:extLst>
+              <a:ext uri="{FF2B5EF4-FFF2-40B4-BE49-F238E27FC236}">
+                <a16:creationId xmlns:a16="http://schemas.microsoft.com/office/drawing/2014/main" id="{A8851C39-C651-6F52-F729-4FAA830FF7E6}"/>
+              </a:ext>
+            </a:extLst>
+          </p:cNvPr>
+          <p:cNvSpPr>
+            <a:spLocks noGrp="1"/>
+          </p:cNvSpPr>
+          <p:nvPr>
+            <p:ph type="title"/>
+          </p:nvPr>
+        </p:nvSpPr>
+        <p:spPr/>
+        <p:txBody>
+          <a:bodyPr/>
+          <a:lstStyle/>
+          <a:p>
+            <a:endParaRPr lang="sk-SK"/>
+          </a:p>
+        </p:txBody>
+      </p:sp>
+      <p:pic>
+        <p:nvPicPr>
+          <p:cNvPr id="4" name="Zástupný objekt pre obsah 3">
+            <a:extLst>
+              <a:ext uri="{FF2B5EF4-FFF2-40B4-BE49-F238E27FC236}">
+                <a16:creationId xmlns:a16="http://schemas.microsoft.com/office/drawing/2014/main" id="{63BA7761-3F8A-2C85-6E90-D714972DBA22}"/>
+              </a:ext>
+            </a:extLst>
+          </p:cNvPr>
+          <p:cNvPicPr>
+            <a:picLocks noGrp="1" noChangeAspect="1"/>
+          </p:cNvPicPr>
+          <p:nvPr>
+            <p:ph idx="1"/>
+          </p:nvPr>
+        </p:nvPicPr>
+        <p:blipFill>
+          <a:blip r:embed="rId2"/>
+          <a:stretch>
+            <a:fillRect/>
+          </a:stretch>
+        </p:blipFill>
+        <p:spPr>
+          <a:xfrm>
+            <a:off x="2594352" y="1690688"/>
+            <a:ext cx="6390142" cy="3725374"/>
+          </a:xfrm>
+          <a:prstGeom prst="rect">
+            <a:avLst/>
+          </a:prstGeom>
+        </p:spPr>
+      </p:pic>
+    </p:spTree>
+    <p:extLst>
+      <p:ext uri="{BB962C8B-B14F-4D97-AF65-F5344CB8AC3E}">
+        <p14:creationId xmlns:p14="http://schemas.microsoft.com/office/powerpoint/2010/main" val="4287308939"/>
+      </p:ext>
+    </p:extLst>
+  </p:cSld>
+  <p:clrMapOvr>
+    <a:masterClrMapping/>
+  </p:clrMapOvr>
+</p:sld>
+</file>
+
+<file path=ppt/slides/slide27.xml><?xml version="1.0" encoding="utf-8"?>
+<p:sld xmlns:a="http://schemas.openxmlformats.org/drawingml/2006/main" xmlns:r="http://schemas.openxmlformats.org/officeDocument/2006/relationships" xmlns:p="http://schemas.openxmlformats.org/presentationml/2006/main">
+  <p:cSld>
+    <p:spTree>
+      <p:nvGrpSpPr>
+        <p:cNvPr id="1" name=""/>
+        <p:cNvGrpSpPr/>
+        <p:nvPr/>
+      </p:nvGrpSpPr>
+      <p:grpSpPr>
+        <a:xfrm>
+          <a:off x="0" y="0"/>
+          <a:ext cx="0" cy="0"/>
+          <a:chOff x="0" y="0"/>
+          <a:chExt cx="0" cy="0"/>
+        </a:xfrm>
+      </p:grpSpPr>
+      <p:sp>
+        <p:nvSpPr>
+          <p:cNvPr id="2" name="Nadpis 1">
+            <a:extLst>
+              <a:ext uri="{FF2B5EF4-FFF2-40B4-BE49-F238E27FC236}">
+                <a16:creationId xmlns:a16="http://schemas.microsoft.com/office/drawing/2014/main" id="{041B1993-80AD-60EB-76D2-9978D4E6818D}"/>
+              </a:ext>
+            </a:extLst>
+          </p:cNvPr>
+          <p:cNvSpPr>
+            <a:spLocks noGrp="1"/>
+          </p:cNvSpPr>
+          <p:nvPr>
+            <p:ph type="title"/>
+          </p:nvPr>
+        </p:nvSpPr>
+        <p:spPr/>
+        <p:txBody>
+          <a:bodyPr/>
+          <a:lstStyle/>
+          <a:p>
+            <a:endParaRPr lang="sk-SK"/>
+          </a:p>
+        </p:txBody>
+      </p:sp>
+      <p:sp>
+        <p:nvSpPr>
+          <p:cNvPr id="3" name="Zástupný objekt pre obsah 2">
+            <a:extLst>
+              <a:ext uri="{FF2B5EF4-FFF2-40B4-BE49-F238E27FC236}">
+                <a16:creationId xmlns:a16="http://schemas.microsoft.com/office/drawing/2014/main" id="{E7269B69-C3C2-8A4E-6990-969F5DE4BB39}"/>
+              </a:ext>
+            </a:extLst>
+          </p:cNvPr>
+          <p:cNvSpPr>
+            <a:spLocks noGrp="1"/>
+          </p:cNvSpPr>
+          <p:nvPr>
+            <p:ph idx="1"/>
+          </p:nvPr>
+        </p:nvSpPr>
+        <p:spPr/>
+        <p:txBody>
+          <a:bodyPr/>
+          <a:lstStyle/>
+          <a:p>
+            <a:endParaRPr lang="sk-SK"/>
+          </a:p>
+        </p:txBody>
+      </p:sp>
+      <p:pic>
+        <p:nvPicPr>
+          <p:cNvPr id="5" name="Obrázok 4">
+            <a:extLst>
+              <a:ext uri="{FF2B5EF4-FFF2-40B4-BE49-F238E27FC236}">
+                <a16:creationId xmlns:a16="http://schemas.microsoft.com/office/drawing/2014/main" id="{D25596D8-8D94-BFB9-56B5-7E6593BE01C7}"/>
+              </a:ext>
+            </a:extLst>
+          </p:cNvPr>
+          <p:cNvPicPr>
+            <a:picLocks noChangeAspect="1"/>
+          </p:cNvPicPr>
+          <p:nvPr/>
+        </p:nvPicPr>
+        <p:blipFill>
+          <a:blip r:embed="rId2"/>
+          <a:stretch>
+            <a:fillRect/>
+          </a:stretch>
+        </p:blipFill>
+        <p:spPr>
+          <a:xfrm>
+            <a:off x="633162" y="365125"/>
+            <a:ext cx="5783465" cy="2177108"/>
+          </a:xfrm>
+          <a:prstGeom prst="rect">
+            <a:avLst/>
+          </a:prstGeom>
+        </p:spPr>
+      </p:pic>
+      <p:pic>
+        <p:nvPicPr>
+          <p:cNvPr id="7" name="Obrázok 6">
+            <a:extLst>
+              <a:ext uri="{FF2B5EF4-FFF2-40B4-BE49-F238E27FC236}">
+                <a16:creationId xmlns:a16="http://schemas.microsoft.com/office/drawing/2014/main" id="{A40791F5-7738-68AB-F3C8-1F23B59B29EF}"/>
+              </a:ext>
+            </a:extLst>
+          </p:cNvPr>
+          <p:cNvPicPr>
+            <a:picLocks noChangeAspect="1"/>
+          </p:cNvPicPr>
+          <p:nvPr/>
+        </p:nvPicPr>
+        <p:blipFill>
+          <a:blip r:embed="rId3"/>
+          <a:stretch>
+            <a:fillRect/>
+          </a:stretch>
+        </p:blipFill>
+        <p:spPr>
+          <a:xfrm>
+            <a:off x="7300172" y="510774"/>
+            <a:ext cx="3904170" cy="4071274"/>
+          </a:xfrm>
+          <a:prstGeom prst="rect">
+            <a:avLst/>
+          </a:prstGeom>
+        </p:spPr>
+      </p:pic>
+      <p:pic>
+        <p:nvPicPr>
+          <p:cNvPr id="9" name="Obrázok 8">
+            <a:extLst>
+              <a:ext uri="{FF2B5EF4-FFF2-40B4-BE49-F238E27FC236}">
+                <a16:creationId xmlns:a16="http://schemas.microsoft.com/office/drawing/2014/main" id="{8F642C86-9EE7-0729-3A95-625DBC92392D}"/>
+              </a:ext>
+            </a:extLst>
+          </p:cNvPr>
+          <p:cNvPicPr>
+            <a:picLocks noChangeAspect="1"/>
+          </p:cNvPicPr>
+          <p:nvPr/>
+        </p:nvPicPr>
+        <p:blipFill>
+          <a:blip r:embed="rId4"/>
+          <a:stretch>
+            <a:fillRect/>
+          </a:stretch>
+        </p:blipFill>
+        <p:spPr>
+          <a:xfrm>
+            <a:off x="838200" y="2915435"/>
+            <a:ext cx="6159523" cy="3778919"/>
+          </a:xfrm>
+          <a:prstGeom prst="rect">
+            <a:avLst/>
+          </a:prstGeom>
+        </p:spPr>
+      </p:pic>
+    </p:spTree>
+    <p:extLst>
+      <p:ext uri="{BB962C8B-B14F-4D97-AF65-F5344CB8AC3E}">
+        <p14:creationId xmlns:p14="http://schemas.microsoft.com/office/powerpoint/2010/main" val="3405567629"/>
       </p:ext>
     </p:extLst>
   </p:cSld>

</xml_diff>

<commit_message>
feat: add interface segregation slides
</commit_message>
<xml_diff>
--- a/Prezentacia.pptx
+++ b/Prezentacia.pptx
@@ -32,6 +32,13 @@
     <p:sldId id="282" r:id="rId26"/>
     <p:sldId id="284" r:id="rId27"/>
     <p:sldId id="283" r:id="rId28"/>
+    <p:sldId id="285" r:id="rId29"/>
+    <p:sldId id="286" r:id="rId30"/>
+    <p:sldId id="287" r:id="rId31"/>
+    <p:sldId id="291" r:id="rId32"/>
+    <p:sldId id="288" r:id="rId33"/>
+    <p:sldId id="289" r:id="rId34"/>
+    <p:sldId id="290" r:id="rId35"/>
   </p:sldIdLst>
   <p:sldSz cx="12192000" cy="6858000"/>
   <p:notesSz cx="6858000" cy="9144000"/>
@@ -6050,6 +6057,205 @@
 </p:sld>
 </file>
 
+<file path=ppt/slides/slide28.xml><?xml version="1.0" encoding="utf-8"?>
+<p:sld xmlns:a="http://schemas.openxmlformats.org/drawingml/2006/main" xmlns:r="http://schemas.openxmlformats.org/officeDocument/2006/relationships" xmlns:p="http://schemas.openxmlformats.org/presentationml/2006/main">
+  <p:cSld>
+    <p:spTree>
+      <p:nvGrpSpPr>
+        <p:cNvPr id="1" name=""/>
+        <p:cNvGrpSpPr/>
+        <p:nvPr/>
+      </p:nvGrpSpPr>
+      <p:grpSpPr>
+        <a:xfrm>
+          <a:off x="0" y="0"/>
+          <a:ext cx="0" cy="0"/>
+          <a:chOff x="0" y="0"/>
+          <a:chExt cx="0" cy="0"/>
+        </a:xfrm>
+      </p:grpSpPr>
+      <p:sp>
+        <p:nvSpPr>
+          <p:cNvPr id="2" name="Nadpis 1">
+            <a:extLst>
+              <a:ext uri="{FF2B5EF4-FFF2-40B4-BE49-F238E27FC236}">
+                <a16:creationId xmlns:a16="http://schemas.microsoft.com/office/drawing/2014/main" id="{1070F7F6-D207-39CE-56AC-1BEB8FC077A5}"/>
+              </a:ext>
+            </a:extLst>
+          </p:cNvPr>
+          <p:cNvSpPr>
+            <a:spLocks noGrp="1"/>
+          </p:cNvSpPr>
+          <p:nvPr>
+            <p:ph type="title"/>
+          </p:nvPr>
+        </p:nvSpPr>
+        <p:spPr/>
+        <p:txBody>
+          <a:bodyPr/>
+          <a:lstStyle/>
+          <a:p>
+            <a:r>
+              <a:rPr lang="sk-SK" sz="5400" b="1" dirty="0"/>
+              <a:t>I</a:t>
+            </a:r>
+            <a:r>
+              <a:rPr lang="sk-SK" sz="5400" dirty="0"/>
+              <a:t>nterface </a:t>
+            </a:r>
+            <a:r>
+              <a:rPr lang="sk-SK" sz="5400" dirty="0" err="1"/>
+              <a:t>segregation</a:t>
+            </a:r>
+            <a:endParaRPr lang="sk-SK" dirty="0"/>
+          </a:p>
+        </p:txBody>
+      </p:sp>
+      <p:pic>
+        <p:nvPicPr>
+          <p:cNvPr id="4" name="Obrázok 3">
+            <a:extLst>
+              <a:ext uri="{FF2B5EF4-FFF2-40B4-BE49-F238E27FC236}">
+                <a16:creationId xmlns:a16="http://schemas.microsoft.com/office/drawing/2014/main" id="{E52EC933-6C64-DFEB-DB66-3595089DC51A}"/>
+              </a:ext>
+            </a:extLst>
+          </p:cNvPr>
+          <p:cNvPicPr>
+            <a:picLocks noChangeAspect="1"/>
+          </p:cNvPicPr>
+          <p:nvPr/>
+        </p:nvPicPr>
+        <p:blipFill>
+          <a:blip r:embed="rId2"/>
+          <a:stretch>
+            <a:fillRect/>
+          </a:stretch>
+        </p:blipFill>
+        <p:spPr>
+          <a:xfrm>
+            <a:off x="5068909" y="3032759"/>
+            <a:ext cx="6393476" cy="3152775"/>
+          </a:xfrm>
+          <a:prstGeom prst="rect">
+            <a:avLst/>
+          </a:prstGeom>
+        </p:spPr>
+      </p:pic>
+      <p:sp>
+        <p:nvSpPr>
+          <p:cNvPr id="6" name="BlokTextu 5">
+            <a:extLst>
+              <a:ext uri="{FF2B5EF4-FFF2-40B4-BE49-F238E27FC236}">
+                <a16:creationId xmlns:a16="http://schemas.microsoft.com/office/drawing/2014/main" id="{A2FB4A57-7378-5B37-E869-ABFF86C4C2B0}"/>
+              </a:ext>
+            </a:extLst>
+          </p:cNvPr>
+          <p:cNvSpPr txBox="1"/>
+          <p:nvPr/>
+        </p:nvSpPr>
+        <p:spPr>
+          <a:xfrm>
+            <a:off x="838200" y="1808480"/>
+            <a:ext cx="7294880" cy="369332"/>
+          </a:xfrm>
+          <a:prstGeom prst="rect">
+            <a:avLst/>
+          </a:prstGeom>
+          <a:noFill/>
+        </p:spPr>
+        <p:txBody>
+          <a:bodyPr wrap="square" rtlCol="0">
+            <a:spAutoFit/>
+          </a:bodyPr>
+          <a:lstStyle/>
+          <a:p>
+            <a:r>
+              <a:rPr lang="en-US" i="1" dirty="0">
+                <a:solidFill>
+                  <a:srgbClr val="202124"/>
+                </a:solidFill>
+                <a:effectLst/>
+                <a:latin typeface="arial" panose="020B0604020202020204" pitchFamily="34" charset="0"/>
+              </a:rPr>
+              <a:t>no code should be forced to depend on methods it does not use.</a:t>
+            </a:r>
+            <a:endParaRPr lang="sk-SK" i="1" dirty="0"/>
+          </a:p>
+        </p:txBody>
+      </p:sp>
+    </p:spTree>
+    <p:extLst>
+      <p:ext uri="{BB962C8B-B14F-4D97-AF65-F5344CB8AC3E}">
+        <p14:creationId xmlns:p14="http://schemas.microsoft.com/office/powerpoint/2010/main" val="2738179184"/>
+      </p:ext>
+    </p:extLst>
+  </p:cSld>
+  <p:clrMapOvr>
+    <a:masterClrMapping/>
+  </p:clrMapOvr>
+</p:sld>
+</file>
+
+<file path=ppt/slides/slide29.xml><?xml version="1.0" encoding="utf-8"?>
+<p:sld xmlns:a="http://schemas.openxmlformats.org/drawingml/2006/main" xmlns:r="http://schemas.openxmlformats.org/officeDocument/2006/relationships" xmlns:p="http://schemas.openxmlformats.org/presentationml/2006/main">
+  <p:cSld>
+    <p:spTree>
+      <p:nvGrpSpPr>
+        <p:cNvPr id="1" name=""/>
+        <p:cNvGrpSpPr/>
+        <p:nvPr/>
+      </p:nvGrpSpPr>
+      <p:grpSpPr>
+        <a:xfrm>
+          <a:off x="0" y="0"/>
+          <a:ext cx="0" cy="0"/>
+          <a:chOff x="0" y="0"/>
+          <a:chExt cx="0" cy="0"/>
+        </a:xfrm>
+      </p:grpSpPr>
+      <p:pic>
+        <p:nvPicPr>
+          <p:cNvPr id="7" name="Obrázok 6">
+            <a:extLst>
+              <a:ext uri="{FF2B5EF4-FFF2-40B4-BE49-F238E27FC236}">
+                <a16:creationId xmlns:a16="http://schemas.microsoft.com/office/drawing/2014/main" id="{59A64AFE-E287-4CC4-D151-58E02BF2E60A}"/>
+              </a:ext>
+            </a:extLst>
+          </p:cNvPr>
+          <p:cNvPicPr>
+            <a:picLocks noChangeAspect="1"/>
+          </p:cNvPicPr>
+          <p:nvPr/>
+        </p:nvPicPr>
+        <p:blipFill>
+          <a:blip r:embed="rId2"/>
+          <a:stretch>
+            <a:fillRect/>
+          </a:stretch>
+        </p:blipFill>
+        <p:spPr>
+          <a:xfrm>
+            <a:off x="1942964" y="2293022"/>
+            <a:ext cx="8306072" cy="2271955"/>
+          </a:xfrm>
+          <a:prstGeom prst="rect">
+            <a:avLst/>
+          </a:prstGeom>
+        </p:spPr>
+      </p:pic>
+    </p:spTree>
+    <p:extLst>
+      <p:ext uri="{BB962C8B-B14F-4D97-AF65-F5344CB8AC3E}">
+        <p14:creationId xmlns:p14="http://schemas.microsoft.com/office/powerpoint/2010/main" val="420925979"/>
+      </p:ext>
+    </p:extLst>
+  </p:cSld>
+  <p:clrMapOvr>
+    <a:masterClrMapping/>
+  </p:clrMapOvr>
+</p:sld>
+</file>
+
 <file path=ppt/slides/slide3.xml><?xml version="1.0" encoding="utf-8"?>
 <p:sld xmlns:a="http://schemas.openxmlformats.org/drawingml/2006/main" xmlns:r="http://schemas.openxmlformats.org/officeDocument/2006/relationships" xmlns:p="http://schemas.openxmlformats.org/presentationml/2006/main">
   <p:cSld>
@@ -6205,6 +6411,486 @@
     <p:extLst>
       <p:ext uri="{BB962C8B-B14F-4D97-AF65-F5344CB8AC3E}">
         <p14:creationId xmlns:p14="http://schemas.microsoft.com/office/powerpoint/2010/main" val="3438430392"/>
+      </p:ext>
+    </p:extLst>
+  </p:cSld>
+  <p:clrMapOvr>
+    <a:masterClrMapping/>
+  </p:clrMapOvr>
+</p:sld>
+</file>
+
+<file path=ppt/slides/slide30.xml><?xml version="1.0" encoding="utf-8"?>
+<p:sld xmlns:a="http://schemas.openxmlformats.org/drawingml/2006/main" xmlns:r="http://schemas.openxmlformats.org/officeDocument/2006/relationships" xmlns:p="http://schemas.openxmlformats.org/presentationml/2006/main">
+  <p:cSld>
+    <p:spTree>
+      <p:nvGrpSpPr>
+        <p:cNvPr id="1" name=""/>
+        <p:cNvGrpSpPr/>
+        <p:nvPr/>
+      </p:nvGrpSpPr>
+      <p:grpSpPr>
+        <a:xfrm>
+          <a:off x="0" y="0"/>
+          <a:ext cx="0" cy="0"/>
+          <a:chOff x="0" y="0"/>
+          <a:chExt cx="0" cy="0"/>
+        </a:xfrm>
+      </p:grpSpPr>
+      <p:pic>
+        <p:nvPicPr>
+          <p:cNvPr id="4" name="Obrázok 3" descr="Obrázok, na ktorom je text&#10;&#10;Automaticky generovaný popis">
+            <a:extLst>
+              <a:ext uri="{FF2B5EF4-FFF2-40B4-BE49-F238E27FC236}">
+                <a16:creationId xmlns:a16="http://schemas.microsoft.com/office/drawing/2014/main" id="{CAE39C63-3DE0-2C33-D87A-C023993CA01C}"/>
+              </a:ext>
+            </a:extLst>
+          </p:cNvPr>
+          <p:cNvPicPr>
+            <a:picLocks noChangeAspect="1"/>
+          </p:cNvPicPr>
+          <p:nvPr/>
+        </p:nvPicPr>
+        <p:blipFill>
+          <a:blip r:embed="rId2"/>
+          <a:stretch>
+            <a:fillRect/>
+          </a:stretch>
+        </p:blipFill>
+        <p:spPr>
+          <a:xfrm>
+            <a:off x="2647768" y="406080"/>
+            <a:ext cx="6896464" cy="2839721"/>
+          </a:xfrm>
+          <a:prstGeom prst="rect">
+            <a:avLst/>
+          </a:prstGeom>
+        </p:spPr>
+      </p:pic>
+      <p:pic>
+        <p:nvPicPr>
+          <p:cNvPr id="7" name="Obrázok 6" descr="Obrázok, na ktorom je text&#10;&#10;Automaticky generovaný popis">
+            <a:extLst>
+              <a:ext uri="{FF2B5EF4-FFF2-40B4-BE49-F238E27FC236}">
+                <a16:creationId xmlns:a16="http://schemas.microsoft.com/office/drawing/2014/main" id="{93CF8102-B402-2C49-57FE-E65D2951DECF}"/>
+              </a:ext>
+            </a:extLst>
+          </p:cNvPr>
+          <p:cNvPicPr>
+            <a:picLocks noChangeAspect="1"/>
+          </p:cNvPicPr>
+          <p:nvPr/>
+        </p:nvPicPr>
+        <p:blipFill>
+          <a:blip r:embed="rId3"/>
+          <a:stretch>
+            <a:fillRect/>
+          </a:stretch>
+        </p:blipFill>
+        <p:spPr>
+          <a:xfrm>
+            <a:off x="2647768" y="3561080"/>
+            <a:ext cx="6896466" cy="2839721"/>
+          </a:xfrm>
+          <a:prstGeom prst="rect">
+            <a:avLst/>
+          </a:prstGeom>
+        </p:spPr>
+      </p:pic>
+    </p:spTree>
+    <p:extLst>
+      <p:ext uri="{BB962C8B-B14F-4D97-AF65-F5344CB8AC3E}">
+        <p14:creationId xmlns:p14="http://schemas.microsoft.com/office/powerpoint/2010/main" val="4257279305"/>
+      </p:ext>
+    </p:extLst>
+  </p:cSld>
+  <p:clrMapOvr>
+    <a:masterClrMapping/>
+  </p:clrMapOvr>
+</p:sld>
+</file>
+
+<file path=ppt/slides/slide31.xml><?xml version="1.0" encoding="utf-8"?>
+<p:sld xmlns:a="http://schemas.openxmlformats.org/drawingml/2006/main" xmlns:r="http://schemas.openxmlformats.org/officeDocument/2006/relationships" xmlns:p="http://schemas.openxmlformats.org/presentationml/2006/main">
+  <p:cSld>
+    <p:spTree>
+      <p:nvGrpSpPr>
+        <p:cNvPr id="1" name=""/>
+        <p:cNvGrpSpPr/>
+        <p:nvPr/>
+      </p:nvGrpSpPr>
+      <p:grpSpPr>
+        <a:xfrm>
+          <a:off x="0" y="0"/>
+          <a:ext cx="0" cy="0"/>
+          <a:chOff x="0" y="0"/>
+          <a:chExt cx="0" cy="0"/>
+        </a:xfrm>
+      </p:grpSpPr>
+      <p:pic>
+        <p:nvPicPr>
+          <p:cNvPr id="4" name="Obrázok 3" descr="Obrázok, na ktorom je text&#10;&#10;Automaticky generovaný popis">
+            <a:extLst>
+              <a:ext uri="{FF2B5EF4-FFF2-40B4-BE49-F238E27FC236}">
+                <a16:creationId xmlns:a16="http://schemas.microsoft.com/office/drawing/2014/main" id="{CAE39C63-3DE0-2C33-D87A-C023993CA01C}"/>
+              </a:ext>
+            </a:extLst>
+          </p:cNvPr>
+          <p:cNvPicPr>
+            <a:picLocks noChangeAspect="1"/>
+          </p:cNvPicPr>
+          <p:nvPr/>
+        </p:nvPicPr>
+        <p:blipFill>
+          <a:blip r:embed="rId2"/>
+          <a:stretch>
+            <a:fillRect/>
+          </a:stretch>
+        </p:blipFill>
+        <p:spPr>
+          <a:xfrm>
+            <a:off x="2647768" y="406080"/>
+            <a:ext cx="6896464" cy="2839721"/>
+          </a:xfrm>
+          <a:prstGeom prst="rect">
+            <a:avLst/>
+          </a:prstGeom>
+        </p:spPr>
+      </p:pic>
+      <p:pic>
+        <p:nvPicPr>
+          <p:cNvPr id="5" name="Obrázok 4" descr="Obrázok, na ktorom je text&#10;&#10;Automaticky generovaný popis">
+            <a:extLst>
+              <a:ext uri="{FF2B5EF4-FFF2-40B4-BE49-F238E27FC236}">
+                <a16:creationId xmlns:a16="http://schemas.microsoft.com/office/drawing/2014/main" id="{9BFBE0EB-CEDF-2C6C-7803-B5E34F863267}"/>
+              </a:ext>
+            </a:extLst>
+          </p:cNvPr>
+          <p:cNvPicPr>
+            <a:picLocks noChangeAspect="1"/>
+          </p:cNvPicPr>
+          <p:nvPr/>
+        </p:nvPicPr>
+        <p:blipFill>
+          <a:blip r:embed="rId3"/>
+          <a:stretch>
+            <a:fillRect/>
+          </a:stretch>
+        </p:blipFill>
+        <p:spPr>
+          <a:xfrm>
+            <a:off x="2647764" y="3564256"/>
+            <a:ext cx="6896468" cy="2839722"/>
+          </a:xfrm>
+          <a:prstGeom prst="rect">
+            <a:avLst/>
+          </a:prstGeom>
+        </p:spPr>
+      </p:pic>
+    </p:spTree>
+    <p:extLst>
+      <p:ext uri="{BB962C8B-B14F-4D97-AF65-F5344CB8AC3E}">
+        <p14:creationId xmlns:p14="http://schemas.microsoft.com/office/powerpoint/2010/main" val="1807846802"/>
+      </p:ext>
+    </p:extLst>
+  </p:cSld>
+  <p:clrMapOvr>
+    <a:masterClrMapping/>
+  </p:clrMapOvr>
+</p:sld>
+</file>
+
+<file path=ppt/slides/slide32.xml><?xml version="1.0" encoding="utf-8"?>
+<p:sld xmlns:a="http://schemas.openxmlformats.org/drawingml/2006/main" xmlns:r="http://schemas.openxmlformats.org/officeDocument/2006/relationships" xmlns:p="http://schemas.openxmlformats.org/presentationml/2006/main">
+  <p:cSld>
+    <p:spTree>
+      <p:nvGrpSpPr>
+        <p:cNvPr id="1" name=""/>
+        <p:cNvGrpSpPr/>
+        <p:nvPr/>
+      </p:nvGrpSpPr>
+      <p:grpSpPr>
+        <a:xfrm>
+          <a:off x="0" y="0"/>
+          <a:ext cx="0" cy="0"/>
+          <a:chOff x="0" y="0"/>
+          <a:chExt cx="0" cy="0"/>
+        </a:xfrm>
+      </p:grpSpPr>
+      <p:pic>
+        <p:nvPicPr>
+          <p:cNvPr id="4" name="Obrázok 3" descr="Obrázok, na ktorom je text&#10;&#10;Automaticky generovaný popis">
+            <a:extLst>
+              <a:ext uri="{FF2B5EF4-FFF2-40B4-BE49-F238E27FC236}">
+                <a16:creationId xmlns:a16="http://schemas.microsoft.com/office/drawing/2014/main" id="{CAE39C63-3DE0-2C33-D87A-C023993CA01C}"/>
+              </a:ext>
+            </a:extLst>
+          </p:cNvPr>
+          <p:cNvPicPr>
+            <a:picLocks noChangeAspect="1"/>
+          </p:cNvPicPr>
+          <p:nvPr/>
+        </p:nvPicPr>
+        <p:blipFill>
+          <a:blip r:embed="rId2"/>
+          <a:stretch>
+            <a:fillRect/>
+          </a:stretch>
+        </p:blipFill>
+        <p:spPr>
+          <a:xfrm>
+            <a:off x="2647768" y="406080"/>
+            <a:ext cx="6896464" cy="2839721"/>
+          </a:xfrm>
+          <a:prstGeom prst="rect">
+            <a:avLst/>
+          </a:prstGeom>
+        </p:spPr>
+      </p:pic>
+      <p:pic>
+        <p:nvPicPr>
+          <p:cNvPr id="5" name="Obrázok 4" descr="Obrázok, na ktorom je text&#10;&#10;Automaticky generovaný popis">
+            <a:extLst>
+              <a:ext uri="{FF2B5EF4-FFF2-40B4-BE49-F238E27FC236}">
+                <a16:creationId xmlns:a16="http://schemas.microsoft.com/office/drawing/2014/main" id="{9BFBE0EB-CEDF-2C6C-7803-B5E34F863267}"/>
+              </a:ext>
+            </a:extLst>
+          </p:cNvPr>
+          <p:cNvPicPr>
+            <a:picLocks noChangeAspect="1"/>
+          </p:cNvPicPr>
+          <p:nvPr/>
+        </p:nvPicPr>
+        <p:blipFill>
+          <a:blip r:embed="rId3"/>
+          <a:stretch>
+            <a:fillRect/>
+          </a:stretch>
+        </p:blipFill>
+        <p:spPr>
+          <a:xfrm>
+            <a:off x="2647764" y="3564256"/>
+            <a:ext cx="6896468" cy="2839722"/>
+          </a:xfrm>
+          <a:prstGeom prst="rect">
+            <a:avLst/>
+          </a:prstGeom>
+        </p:spPr>
+      </p:pic>
+      <p:pic>
+        <p:nvPicPr>
+          <p:cNvPr id="3" name="Obrázok 2">
+            <a:extLst>
+              <a:ext uri="{FF2B5EF4-FFF2-40B4-BE49-F238E27FC236}">
+                <a16:creationId xmlns:a16="http://schemas.microsoft.com/office/drawing/2014/main" id="{847CE21C-3BE3-6DB7-F5B3-8502887BDE9E}"/>
+              </a:ext>
+            </a:extLst>
+          </p:cNvPr>
+          <p:cNvPicPr>
+            <a:picLocks noChangeAspect="1"/>
+          </p:cNvPicPr>
+          <p:nvPr/>
+        </p:nvPicPr>
+        <p:blipFill>
+          <a:blip r:embed="rId4"/>
+          <a:stretch>
+            <a:fillRect/>
+          </a:stretch>
+        </p:blipFill>
+        <p:spPr>
+          <a:xfrm>
+            <a:off x="3657598" y="990600"/>
+            <a:ext cx="4876800" cy="4876800"/>
+          </a:xfrm>
+          <a:prstGeom prst="rect">
+            <a:avLst/>
+          </a:prstGeom>
+        </p:spPr>
+      </p:pic>
+    </p:spTree>
+    <p:extLst>
+      <p:ext uri="{BB962C8B-B14F-4D97-AF65-F5344CB8AC3E}">
+        <p14:creationId xmlns:p14="http://schemas.microsoft.com/office/powerpoint/2010/main" val="2686006239"/>
+      </p:ext>
+    </p:extLst>
+  </p:cSld>
+  <p:clrMapOvr>
+    <a:masterClrMapping/>
+  </p:clrMapOvr>
+</p:sld>
+</file>
+
+<file path=ppt/slides/slide33.xml><?xml version="1.0" encoding="utf-8"?>
+<p:sld xmlns:a="http://schemas.openxmlformats.org/drawingml/2006/main" xmlns:r="http://schemas.openxmlformats.org/officeDocument/2006/relationships" xmlns:p="http://schemas.openxmlformats.org/presentationml/2006/main">
+  <p:cSld>
+    <p:spTree>
+      <p:nvGrpSpPr>
+        <p:cNvPr id="1" name=""/>
+        <p:cNvGrpSpPr/>
+        <p:nvPr/>
+      </p:nvGrpSpPr>
+      <p:grpSpPr>
+        <a:xfrm>
+          <a:off x="0" y="0"/>
+          <a:ext cx="0" cy="0"/>
+          <a:chOff x="0" y="0"/>
+          <a:chExt cx="0" cy="0"/>
+        </a:xfrm>
+      </p:grpSpPr>
+      <p:pic>
+        <p:nvPicPr>
+          <p:cNvPr id="6" name="Obrázok 5">
+            <a:extLst>
+              <a:ext uri="{FF2B5EF4-FFF2-40B4-BE49-F238E27FC236}">
+                <a16:creationId xmlns:a16="http://schemas.microsoft.com/office/drawing/2014/main" id="{EB030B10-24C8-6A2C-967C-84DBA8F83932}"/>
+              </a:ext>
+            </a:extLst>
+          </p:cNvPr>
+          <p:cNvPicPr>
+            <a:picLocks noChangeAspect="1"/>
+          </p:cNvPicPr>
+          <p:nvPr/>
+        </p:nvPicPr>
+        <p:blipFill>
+          <a:blip r:embed="rId2"/>
+          <a:stretch>
+            <a:fillRect/>
+          </a:stretch>
+        </p:blipFill>
+        <p:spPr>
+          <a:xfrm>
+            <a:off x="1554480" y="1349876"/>
+            <a:ext cx="9083040" cy="1749821"/>
+          </a:xfrm>
+          <a:prstGeom prst="rect">
+            <a:avLst/>
+          </a:prstGeom>
+        </p:spPr>
+      </p:pic>
+      <p:pic>
+        <p:nvPicPr>
+          <p:cNvPr id="8" name="Obrázok 7">
+            <a:extLst>
+              <a:ext uri="{FF2B5EF4-FFF2-40B4-BE49-F238E27FC236}">
+                <a16:creationId xmlns:a16="http://schemas.microsoft.com/office/drawing/2014/main" id="{862CB397-0F35-E2F3-73C3-8BA6E6BE659B}"/>
+              </a:ext>
+            </a:extLst>
+          </p:cNvPr>
+          <p:cNvPicPr>
+            <a:picLocks noChangeAspect="1"/>
+          </p:cNvPicPr>
+          <p:nvPr/>
+        </p:nvPicPr>
+        <p:blipFill>
+          <a:blip r:embed="rId3"/>
+          <a:stretch>
+            <a:fillRect/>
+          </a:stretch>
+        </p:blipFill>
+        <p:spPr>
+          <a:xfrm>
+            <a:off x="1554479" y="3723102"/>
+            <a:ext cx="9083037" cy="1749820"/>
+          </a:xfrm>
+          <a:prstGeom prst="rect">
+            <a:avLst/>
+          </a:prstGeom>
+        </p:spPr>
+      </p:pic>
+    </p:spTree>
+    <p:extLst>
+      <p:ext uri="{BB962C8B-B14F-4D97-AF65-F5344CB8AC3E}">
+        <p14:creationId xmlns:p14="http://schemas.microsoft.com/office/powerpoint/2010/main" val="349688000"/>
+      </p:ext>
+    </p:extLst>
+  </p:cSld>
+  <p:clrMapOvr>
+    <a:masterClrMapping/>
+  </p:clrMapOvr>
+</p:sld>
+</file>
+
+<file path=ppt/slides/slide34.xml><?xml version="1.0" encoding="utf-8"?>
+<p:sld xmlns:a="http://schemas.openxmlformats.org/drawingml/2006/main" xmlns:r="http://schemas.openxmlformats.org/officeDocument/2006/relationships" xmlns:p="http://schemas.openxmlformats.org/presentationml/2006/main">
+  <p:cSld>
+    <p:spTree>
+      <p:nvGrpSpPr>
+        <p:cNvPr id="1" name=""/>
+        <p:cNvGrpSpPr/>
+        <p:nvPr/>
+      </p:nvGrpSpPr>
+      <p:grpSpPr>
+        <a:xfrm>
+          <a:off x="0" y="0"/>
+          <a:ext cx="0" cy="0"/>
+          <a:chOff x="0" y="0"/>
+          <a:chExt cx="0" cy="0"/>
+        </a:xfrm>
+      </p:grpSpPr>
+      <p:pic>
+        <p:nvPicPr>
+          <p:cNvPr id="9" name="Obrázok 8" descr="Obrázok, na ktorom je text&#10;&#10;Automaticky generovaný popis">
+            <a:extLst>
+              <a:ext uri="{FF2B5EF4-FFF2-40B4-BE49-F238E27FC236}">
+                <a16:creationId xmlns:a16="http://schemas.microsoft.com/office/drawing/2014/main" id="{00FC07E9-F865-E591-57FC-DCA44ACB3103}"/>
+              </a:ext>
+            </a:extLst>
+          </p:cNvPr>
+          <p:cNvPicPr>
+            <a:picLocks noChangeAspect="1"/>
+          </p:cNvPicPr>
+          <p:nvPr/>
+        </p:nvPicPr>
+        <p:blipFill>
+          <a:blip r:embed="rId2"/>
+          <a:stretch>
+            <a:fillRect/>
+          </a:stretch>
+        </p:blipFill>
+        <p:spPr>
+          <a:xfrm>
+            <a:off x="2059709" y="3026837"/>
+            <a:ext cx="8045864" cy="3313003"/>
+          </a:xfrm>
+          <a:prstGeom prst="rect">
+            <a:avLst/>
+          </a:prstGeom>
+        </p:spPr>
+      </p:pic>
+      <p:pic>
+        <p:nvPicPr>
+          <p:cNvPr id="11" name="Obrázok 10" descr="Obrázok, na ktorom je text&#10;&#10;Automaticky generovaný popis">
+            <a:extLst>
+              <a:ext uri="{FF2B5EF4-FFF2-40B4-BE49-F238E27FC236}">
+                <a16:creationId xmlns:a16="http://schemas.microsoft.com/office/drawing/2014/main" id="{F1F688FE-0C40-FCF0-5D16-8EFE2FAA49E4}"/>
+              </a:ext>
+            </a:extLst>
+          </p:cNvPr>
+          <p:cNvPicPr>
+            <a:picLocks noChangeAspect="1"/>
+          </p:cNvPicPr>
+          <p:nvPr/>
+        </p:nvPicPr>
+        <p:blipFill>
+          <a:blip r:embed="rId3"/>
+          <a:stretch>
+            <a:fillRect/>
+          </a:stretch>
+        </p:blipFill>
+        <p:spPr>
+          <a:xfrm>
+            <a:off x="2073068" y="518160"/>
+            <a:ext cx="8045864" cy="2212613"/>
+          </a:xfrm>
+          <a:prstGeom prst="rect">
+            <a:avLst/>
+          </a:prstGeom>
+        </p:spPr>
+      </p:pic>
+    </p:spTree>
+    <p:extLst>
+      <p:ext uri="{BB962C8B-B14F-4D97-AF65-F5344CB8AC3E}">
+        <p14:creationId xmlns:p14="http://schemas.microsoft.com/office/powerpoint/2010/main" val="1952209445"/>
       </p:ext>
     </p:extLst>
   </p:cSld>

</xml_diff>

<commit_message>
feat: add DI slides
</commit_message>
<xml_diff>
--- a/Prezentacia.pptx
+++ b/Prezentacia.pptx
@@ -39,6 +39,15 @@
     <p:sldId id="288" r:id="rId33"/>
     <p:sldId id="289" r:id="rId34"/>
     <p:sldId id="290" r:id="rId35"/>
+    <p:sldId id="292" r:id="rId36"/>
+    <p:sldId id="293" r:id="rId37"/>
+    <p:sldId id="294" r:id="rId38"/>
+    <p:sldId id="295" r:id="rId39"/>
+    <p:sldId id="296" r:id="rId40"/>
+    <p:sldId id="297" r:id="rId41"/>
+    <p:sldId id="298" r:id="rId42"/>
+    <p:sldId id="299" r:id="rId43"/>
+    <p:sldId id="300" r:id="rId44"/>
   </p:sldIdLst>
   <p:sldSz cx="12192000" cy="6858000"/>
   <p:notesSz cx="6858000" cy="9144000"/>
@@ -6900,6 +6909,441 @@
 </p:sld>
 </file>
 
+<file path=ppt/slides/slide35.xml><?xml version="1.0" encoding="utf-8"?>
+<p:sld xmlns:a="http://schemas.openxmlformats.org/drawingml/2006/main" xmlns:r="http://schemas.openxmlformats.org/officeDocument/2006/relationships" xmlns:p="http://schemas.openxmlformats.org/presentationml/2006/main">
+  <p:cSld>
+    <p:spTree>
+      <p:nvGrpSpPr>
+        <p:cNvPr id="1" name=""/>
+        <p:cNvGrpSpPr/>
+        <p:nvPr/>
+      </p:nvGrpSpPr>
+      <p:grpSpPr>
+        <a:xfrm>
+          <a:off x="0" y="0"/>
+          <a:ext cx="0" cy="0"/>
+          <a:chOff x="0" y="0"/>
+          <a:chExt cx="0" cy="0"/>
+        </a:xfrm>
+      </p:grpSpPr>
+      <p:sp>
+        <p:nvSpPr>
+          <p:cNvPr id="2" name="Nadpis 1">
+            <a:extLst>
+              <a:ext uri="{FF2B5EF4-FFF2-40B4-BE49-F238E27FC236}">
+                <a16:creationId xmlns:a16="http://schemas.microsoft.com/office/drawing/2014/main" id="{1070F7F6-D207-39CE-56AC-1BEB8FC077A5}"/>
+              </a:ext>
+            </a:extLst>
+          </p:cNvPr>
+          <p:cNvSpPr>
+            <a:spLocks noGrp="1"/>
+          </p:cNvSpPr>
+          <p:nvPr>
+            <p:ph type="title"/>
+          </p:nvPr>
+        </p:nvSpPr>
+        <p:spPr/>
+        <p:txBody>
+          <a:bodyPr/>
+          <a:lstStyle/>
+          <a:p>
+            <a:r>
+              <a:rPr lang="en-US" b="1" dirty="0"/>
+              <a:t>D</a:t>
+            </a:r>
+            <a:r>
+              <a:rPr lang="en-US" dirty="0"/>
+              <a:t>ependency inversion (+dependency injection)</a:t>
+            </a:r>
+            <a:endParaRPr lang="sk-SK" dirty="0"/>
+          </a:p>
+        </p:txBody>
+      </p:sp>
+      <p:sp>
+        <p:nvSpPr>
+          <p:cNvPr id="6" name="BlokTextu 5">
+            <a:extLst>
+              <a:ext uri="{FF2B5EF4-FFF2-40B4-BE49-F238E27FC236}">
+                <a16:creationId xmlns:a16="http://schemas.microsoft.com/office/drawing/2014/main" id="{A2FB4A57-7378-5B37-E869-ABFF86C4C2B0}"/>
+              </a:ext>
+            </a:extLst>
+          </p:cNvPr>
+          <p:cNvSpPr txBox="1"/>
+          <p:nvPr/>
+        </p:nvSpPr>
+        <p:spPr>
+          <a:xfrm>
+            <a:off x="838200" y="1838960"/>
+            <a:ext cx="7294880" cy="646331"/>
+          </a:xfrm>
+          <a:prstGeom prst="rect">
+            <a:avLst/>
+          </a:prstGeom>
+          <a:noFill/>
+        </p:spPr>
+        <p:txBody>
+          <a:bodyPr wrap="square" rtlCol="0">
+            <a:spAutoFit/>
+          </a:bodyPr>
+          <a:lstStyle/>
+          <a:p>
+            <a:r>
+              <a:rPr lang="en-US" i="1" dirty="0">
+                <a:solidFill>
+                  <a:srgbClr val="202124"/>
+                </a:solidFill>
+                <a:effectLst/>
+                <a:latin typeface="arial" panose="020B0604020202020204" pitchFamily="34" charset="0"/>
+              </a:rPr>
+              <a:t>high level modules should not depend on low level modules; both should depend on abstractions.</a:t>
+            </a:r>
+            <a:endParaRPr lang="sk-SK" i="1" dirty="0"/>
+          </a:p>
+        </p:txBody>
+      </p:sp>
+    </p:spTree>
+    <p:extLst>
+      <p:ext uri="{BB962C8B-B14F-4D97-AF65-F5344CB8AC3E}">
+        <p14:creationId xmlns:p14="http://schemas.microsoft.com/office/powerpoint/2010/main" val="889477995"/>
+      </p:ext>
+    </p:extLst>
+  </p:cSld>
+  <p:clrMapOvr>
+    <a:masterClrMapping/>
+  </p:clrMapOvr>
+</p:sld>
+</file>
+
+<file path=ppt/slides/slide36.xml><?xml version="1.0" encoding="utf-8"?>
+<p:sld xmlns:a="http://schemas.openxmlformats.org/drawingml/2006/main" xmlns:r="http://schemas.openxmlformats.org/officeDocument/2006/relationships" xmlns:p="http://schemas.openxmlformats.org/presentationml/2006/main">
+  <p:cSld>
+    <p:spTree>
+      <p:nvGrpSpPr>
+        <p:cNvPr id="1" name=""/>
+        <p:cNvGrpSpPr/>
+        <p:nvPr/>
+      </p:nvGrpSpPr>
+      <p:grpSpPr>
+        <a:xfrm>
+          <a:off x="0" y="0"/>
+          <a:ext cx="0" cy="0"/>
+          <a:chOff x="0" y="0"/>
+          <a:chExt cx="0" cy="0"/>
+        </a:xfrm>
+      </p:grpSpPr>
+      <p:pic>
+        <p:nvPicPr>
+          <p:cNvPr id="7" name="Obrázok 6">
+            <a:extLst>
+              <a:ext uri="{FF2B5EF4-FFF2-40B4-BE49-F238E27FC236}">
+                <a16:creationId xmlns:a16="http://schemas.microsoft.com/office/drawing/2014/main" id="{93ABF99F-0FCF-C8C2-0EC9-C2D642E92B23}"/>
+              </a:ext>
+            </a:extLst>
+          </p:cNvPr>
+          <p:cNvPicPr>
+            <a:picLocks noChangeAspect="1"/>
+          </p:cNvPicPr>
+          <p:nvPr/>
+        </p:nvPicPr>
+        <p:blipFill>
+          <a:blip r:embed="rId2"/>
+          <a:stretch>
+            <a:fillRect/>
+          </a:stretch>
+        </p:blipFill>
+        <p:spPr>
+          <a:xfrm>
+            <a:off x="2010149" y="1752599"/>
+            <a:ext cx="8171701" cy="3352801"/>
+          </a:xfrm>
+          <a:prstGeom prst="rect">
+            <a:avLst/>
+          </a:prstGeom>
+        </p:spPr>
+      </p:pic>
+    </p:spTree>
+    <p:extLst>
+      <p:ext uri="{BB962C8B-B14F-4D97-AF65-F5344CB8AC3E}">
+        <p14:creationId xmlns:p14="http://schemas.microsoft.com/office/powerpoint/2010/main" val="2559936061"/>
+      </p:ext>
+    </p:extLst>
+  </p:cSld>
+  <p:clrMapOvr>
+    <a:masterClrMapping/>
+  </p:clrMapOvr>
+</p:sld>
+</file>
+
+<file path=ppt/slides/slide37.xml><?xml version="1.0" encoding="utf-8"?>
+<p:sld xmlns:a="http://schemas.openxmlformats.org/drawingml/2006/main" xmlns:r="http://schemas.openxmlformats.org/officeDocument/2006/relationships" xmlns:p="http://schemas.openxmlformats.org/presentationml/2006/main">
+  <p:cSld>
+    <p:spTree>
+      <p:nvGrpSpPr>
+        <p:cNvPr id="1" name=""/>
+        <p:cNvGrpSpPr/>
+        <p:nvPr/>
+      </p:nvGrpSpPr>
+      <p:grpSpPr>
+        <a:xfrm>
+          <a:off x="0" y="0"/>
+          <a:ext cx="0" cy="0"/>
+          <a:chOff x="0" y="0"/>
+          <a:chExt cx="0" cy="0"/>
+        </a:xfrm>
+      </p:grpSpPr>
+      <p:pic>
+        <p:nvPicPr>
+          <p:cNvPr id="7" name="Obrázok 6">
+            <a:extLst>
+              <a:ext uri="{FF2B5EF4-FFF2-40B4-BE49-F238E27FC236}">
+                <a16:creationId xmlns:a16="http://schemas.microsoft.com/office/drawing/2014/main" id="{93ABF99F-0FCF-C8C2-0EC9-C2D642E92B23}"/>
+              </a:ext>
+            </a:extLst>
+          </p:cNvPr>
+          <p:cNvPicPr>
+            <a:picLocks noChangeAspect="1"/>
+          </p:cNvPicPr>
+          <p:nvPr/>
+        </p:nvPicPr>
+        <p:blipFill>
+          <a:blip r:embed="rId2"/>
+          <a:stretch>
+            <a:fillRect/>
+          </a:stretch>
+        </p:blipFill>
+        <p:spPr>
+          <a:xfrm>
+            <a:off x="2010149" y="1752599"/>
+            <a:ext cx="8171701" cy="3352801"/>
+          </a:xfrm>
+          <a:prstGeom prst="rect">
+            <a:avLst/>
+          </a:prstGeom>
+        </p:spPr>
+      </p:pic>
+      <p:pic>
+        <p:nvPicPr>
+          <p:cNvPr id="3" name="Obrázok 2">
+            <a:extLst>
+              <a:ext uri="{FF2B5EF4-FFF2-40B4-BE49-F238E27FC236}">
+                <a16:creationId xmlns:a16="http://schemas.microsoft.com/office/drawing/2014/main" id="{9F419753-6549-E486-F40F-BA8AF6347F95}"/>
+              </a:ext>
+            </a:extLst>
+          </p:cNvPr>
+          <p:cNvPicPr>
+            <a:picLocks noChangeAspect="1"/>
+          </p:cNvPicPr>
+          <p:nvPr/>
+        </p:nvPicPr>
+        <p:blipFill>
+          <a:blip r:embed="rId3"/>
+          <a:stretch>
+            <a:fillRect/>
+          </a:stretch>
+        </p:blipFill>
+        <p:spPr>
+          <a:xfrm>
+            <a:off x="3657599" y="990599"/>
+            <a:ext cx="4876800" cy="4876800"/>
+          </a:xfrm>
+          <a:prstGeom prst="rect">
+            <a:avLst/>
+          </a:prstGeom>
+        </p:spPr>
+      </p:pic>
+    </p:spTree>
+    <p:extLst>
+      <p:ext uri="{BB962C8B-B14F-4D97-AF65-F5344CB8AC3E}">
+        <p14:creationId xmlns:p14="http://schemas.microsoft.com/office/powerpoint/2010/main" val="1247563487"/>
+      </p:ext>
+    </p:extLst>
+  </p:cSld>
+  <p:clrMapOvr>
+    <a:masterClrMapping/>
+  </p:clrMapOvr>
+</p:sld>
+</file>
+
+<file path=ppt/slides/slide38.xml><?xml version="1.0" encoding="utf-8"?>
+<p:sld xmlns:a="http://schemas.openxmlformats.org/drawingml/2006/main" xmlns:r="http://schemas.openxmlformats.org/officeDocument/2006/relationships" xmlns:p="http://schemas.openxmlformats.org/presentationml/2006/main">
+  <p:cSld>
+    <p:spTree>
+      <p:nvGrpSpPr>
+        <p:cNvPr id="1" name=""/>
+        <p:cNvGrpSpPr/>
+        <p:nvPr/>
+      </p:nvGrpSpPr>
+      <p:grpSpPr>
+        <a:xfrm>
+          <a:off x="0" y="0"/>
+          <a:ext cx="0" cy="0"/>
+          <a:chOff x="0" y="0"/>
+          <a:chExt cx="0" cy="0"/>
+        </a:xfrm>
+      </p:grpSpPr>
+      <p:pic>
+        <p:nvPicPr>
+          <p:cNvPr id="3" name="Obrázok 2">
+            <a:extLst>
+              <a:ext uri="{FF2B5EF4-FFF2-40B4-BE49-F238E27FC236}">
+                <a16:creationId xmlns:a16="http://schemas.microsoft.com/office/drawing/2014/main" id="{DABC92B9-7F3B-9092-72BF-6B8CF58BC0FF}"/>
+              </a:ext>
+            </a:extLst>
+          </p:cNvPr>
+          <p:cNvPicPr>
+            <a:picLocks noChangeAspect="1"/>
+          </p:cNvPicPr>
+          <p:nvPr/>
+        </p:nvPicPr>
+        <p:blipFill>
+          <a:blip r:embed="rId2"/>
+          <a:stretch>
+            <a:fillRect/>
+          </a:stretch>
+        </p:blipFill>
+        <p:spPr>
+          <a:xfrm>
+            <a:off x="1750136" y="1518098"/>
+            <a:ext cx="8691728" cy="3821804"/>
+          </a:xfrm>
+          <a:prstGeom prst="rect">
+            <a:avLst/>
+          </a:prstGeom>
+        </p:spPr>
+      </p:pic>
+    </p:spTree>
+    <p:extLst>
+      <p:ext uri="{BB962C8B-B14F-4D97-AF65-F5344CB8AC3E}">
+        <p14:creationId xmlns:p14="http://schemas.microsoft.com/office/powerpoint/2010/main" val="329788471"/>
+      </p:ext>
+    </p:extLst>
+  </p:cSld>
+  <p:clrMapOvr>
+    <a:masterClrMapping/>
+  </p:clrMapOvr>
+</p:sld>
+</file>
+
+<file path=ppt/slides/slide39.xml><?xml version="1.0" encoding="utf-8"?>
+<p:sld xmlns:a="http://schemas.openxmlformats.org/drawingml/2006/main" xmlns:r="http://schemas.openxmlformats.org/officeDocument/2006/relationships" xmlns:p="http://schemas.openxmlformats.org/presentationml/2006/main">
+  <p:cSld>
+    <p:spTree>
+      <p:nvGrpSpPr>
+        <p:cNvPr id="1" name=""/>
+        <p:cNvGrpSpPr/>
+        <p:nvPr/>
+      </p:nvGrpSpPr>
+      <p:grpSpPr>
+        <a:xfrm>
+          <a:off x="0" y="0"/>
+          <a:ext cx="0" cy="0"/>
+          <a:chOff x="0" y="0"/>
+          <a:chExt cx="0" cy="0"/>
+        </a:xfrm>
+      </p:grpSpPr>
+      <p:pic>
+        <p:nvPicPr>
+          <p:cNvPr id="3" name="Obrázok 2">
+            <a:extLst>
+              <a:ext uri="{FF2B5EF4-FFF2-40B4-BE49-F238E27FC236}">
+                <a16:creationId xmlns:a16="http://schemas.microsoft.com/office/drawing/2014/main" id="{DABC92B9-7F3B-9092-72BF-6B8CF58BC0FF}"/>
+              </a:ext>
+            </a:extLst>
+          </p:cNvPr>
+          <p:cNvPicPr>
+            <a:picLocks noChangeAspect="1"/>
+          </p:cNvPicPr>
+          <p:nvPr/>
+        </p:nvPicPr>
+        <p:blipFill>
+          <a:blip r:embed="rId2"/>
+          <a:stretch>
+            <a:fillRect/>
+          </a:stretch>
+        </p:blipFill>
+        <p:spPr>
+          <a:xfrm>
+            <a:off x="1750136" y="1518098"/>
+            <a:ext cx="8691728" cy="3821804"/>
+          </a:xfrm>
+          <a:prstGeom prst="rect">
+            <a:avLst/>
+          </a:prstGeom>
+        </p:spPr>
+      </p:pic>
+      <p:pic>
+        <p:nvPicPr>
+          <p:cNvPr id="4" name="Obrázok 3">
+            <a:extLst>
+              <a:ext uri="{FF2B5EF4-FFF2-40B4-BE49-F238E27FC236}">
+                <a16:creationId xmlns:a16="http://schemas.microsoft.com/office/drawing/2014/main" id="{CF977A12-FF25-49EB-F064-F18FAB42AD47}"/>
+              </a:ext>
+            </a:extLst>
+          </p:cNvPr>
+          <p:cNvPicPr>
+            <a:picLocks noChangeAspect="1"/>
+          </p:cNvPicPr>
+          <p:nvPr/>
+        </p:nvPicPr>
+        <p:blipFill>
+          <a:blip r:embed="rId3"/>
+          <a:stretch>
+            <a:fillRect/>
+          </a:stretch>
+        </p:blipFill>
+        <p:spPr>
+          <a:xfrm>
+            <a:off x="1463040" y="3002280"/>
+            <a:ext cx="2438400" cy="2438400"/>
+          </a:xfrm>
+          <a:prstGeom prst="rect">
+            <a:avLst/>
+          </a:prstGeom>
+        </p:spPr>
+      </p:pic>
+      <p:pic>
+        <p:nvPicPr>
+          <p:cNvPr id="6" name="Obrázok 5">
+            <a:extLst>
+              <a:ext uri="{FF2B5EF4-FFF2-40B4-BE49-F238E27FC236}">
+                <a16:creationId xmlns:a16="http://schemas.microsoft.com/office/drawing/2014/main" id="{38B8C301-5BF9-B140-CDF9-FD4E35DBF02B}"/>
+              </a:ext>
+            </a:extLst>
+          </p:cNvPr>
+          <p:cNvPicPr>
+            <a:picLocks noChangeAspect="1"/>
+          </p:cNvPicPr>
+          <p:nvPr/>
+        </p:nvPicPr>
+        <p:blipFill>
+          <a:blip r:embed="rId4"/>
+          <a:stretch>
+            <a:fillRect/>
+          </a:stretch>
+        </p:blipFill>
+        <p:spPr>
+          <a:xfrm>
+            <a:off x="6563360" y="460894"/>
+            <a:ext cx="3180430" cy="4192385"/>
+          </a:xfrm>
+          <a:prstGeom prst="rect">
+            <a:avLst/>
+          </a:prstGeom>
+        </p:spPr>
+      </p:pic>
+    </p:spTree>
+    <p:extLst>
+      <p:ext uri="{BB962C8B-B14F-4D97-AF65-F5344CB8AC3E}">
+        <p14:creationId xmlns:p14="http://schemas.microsoft.com/office/powerpoint/2010/main" val="495381919"/>
+      </p:ext>
+    </p:extLst>
+  </p:cSld>
+  <p:clrMapOvr>
+    <a:masterClrMapping/>
+  </p:clrMapOvr>
+</p:sld>
+</file>
+
 <file path=ppt/slides/slide4.xml><?xml version="1.0" encoding="utf-8"?>
 <p:sld xmlns:a="http://schemas.openxmlformats.org/drawingml/2006/main" xmlns:r="http://schemas.openxmlformats.org/officeDocument/2006/relationships" xmlns:p="http://schemas.openxmlformats.org/presentationml/2006/main">
   <p:cSld>
@@ -6983,6 +7427,280 @@
     <p:extLst>
       <p:ext uri="{BB962C8B-B14F-4D97-AF65-F5344CB8AC3E}">
         <p14:creationId xmlns:p14="http://schemas.microsoft.com/office/powerpoint/2010/main" val="3143415320"/>
+      </p:ext>
+    </p:extLst>
+  </p:cSld>
+  <p:clrMapOvr>
+    <a:masterClrMapping/>
+  </p:clrMapOvr>
+</p:sld>
+</file>
+
+<file path=ppt/slides/slide40.xml><?xml version="1.0" encoding="utf-8"?>
+<p:sld xmlns:a="http://schemas.openxmlformats.org/drawingml/2006/main" xmlns:r="http://schemas.openxmlformats.org/officeDocument/2006/relationships" xmlns:p="http://schemas.openxmlformats.org/presentationml/2006/main">
+  <p:cSld>
+    <p:spTree>
+      <p:nvGrpSpPr>
+        <p:cNvPr id="1" name=""/>
+        <p:cNvGrpSpPr/>
+        <p:nvPr/>
+      </p:nvGrpSpPr>
+      <p:grpSpPr>
+        <a:xfrm>
+          <a:off x="0" y="0"/>
+          <a:ext cx="0" cy="0"/>
+          <a:chOff x="0" y="0"/>
+          <a:chExt cx="0" cy="0"/>
+        </a:xfrm>
+      </p:grpSpPr>
+      <p:pic>
+        <p:nvPicPr>
+          <p:cNvPr id="4" name="Obrázok 3">
+            <a:extLst>
+              <a:ext uri="{FF2B5EF4-FFF2-40B4-BE49-F238E27FC236}">
+                <a16:creationId xmlns:a16="http://schemas.microsoft.com/office/drawing/2014/main" id="{91170806-4890-F2D0-1B07-F12C45FADC1A}"/>
+              </a:ext>
+            </a:extLst>
+          </p:cNvPr>
+          <p:cNvPicPr>
+            <a:picLocks noChangeAspect="1"/>
+          </p:cNvPicPr>
+          <p:nvPr/>
+        </p:nvPicPr>
+        <p:blipFill>
+          <a:blip r:embed="rId2"/>
+          <a:stretch>
+            <a:fillRect/>
+          </a:stretch>
+        </p:blipFill>
+        <p:spPr>
+          <a:xfrm>
+            <a:off x="2030912" y="1755140"/>
+            <a:ext cx="8130176" cy="3347719"/>
+          </a:xfrm>
+          <a:prstGeom prst="rect">
+            <a:avLst/>
+          </a:prstGeom>
+        </p:spPr>
+      </p:pic>
+    </p:spTree>
+    <p:extLst>
+      <p:ext uri="{BB962C8B-B14F-4D97-AF65-F5344CB8AC3E}">
+        <p14:creationId xmlns:p14="http://schemas.microsoft.com/office/powerpoint/2010/main" val="3979703640"/>
+      </p:ext>
+    </p:extLst>
+  </p:cSld>
+  <p:clrMapOvr>
+    <a:masterClrMapping/>
+  </p:clrMapOvr>
+</p:sld>
+</file>
+
+<file path=ppt/slides/slide41.xml><?xml version="1.0" encoding="utf-8"?>
+<p:sld xmlns:a="http://schemas.openxmlformats.org/drawingml/2006/main" xmlns:r="http://schemas.openxmlformats.org/officeDocument/2006/relationships" xmlns:p="http://schemas.openxmlformats.org/presentationml/2006/main">
+  <p:cSld>
+    <p:spTree>
+      <p:nvGrpSpPr>
+        <p:cNvPr id="1" name=""/>
+        <p:cNvGrpSpPr/>
+        <p:nvPr/>
+      </p:nvGrpSpPr>
+      <p:grpSpPr>
+        <a:xfrm>
+          <a:off x="0" y="0"/>
+          <a:ext cx="0" cy="0"/>
+          <a:chOff x="0" y="0"/>
+          <a:chExt cx="0" cy="0"/>
+        </a:xfrm>
+      </p:grpSpPr>
+      <p:pic>
+        <p:nvPicPr>
+          <p:cNvPr id="3" name="Obrázok 2">
+            <a:extLst>
+              <a:ext uri="{FF2B5EF4-FFF2-40B4-BE49-F238E27FC236}">
+                <a16:creationId xmlns:a16="http://schemas.microsoft.com/office/drawing/2014/main" id="{3E08F067-150F-DAAB-F6E2-F30B4B696081}"/>
+              </a:ext>
+            </a:extLst>
+          </p:cNvPr>
+          <p:cNvPicPr>
+            <a:picLocks noChangeAspect="1"/>
+          </p:cNvPicPr>
+          <p:nvPr/>
+        </p:nvPicPr>
+        <p:blipFill>
+          <a:blip r:embed="rId2"/>
+          <a:stretch>
+            <a:fillRect/>
+          </a:stretch>
+        </p:blipFill>
+        <p:spPr>
+          <a:xfrm>
+            <a:off x="1810789" y="223966"/>
+            <a:ext cx="8570422" cy="2356866"/>
+          </a:xfrm>
+          <a:prstGeom prst="rect">
+            <a:avLst/>
+          </a:prstGeom>
+        </p:spPr>
+      </p:pic>
+      <p:pic>
+        <p:nvPicPr>
+          <p:cNvPr id="6" name="Obrázok 5">
+            <a:extLst>
+              <a:ext uri="{FF2B5EF4-FFF2-40B4-BE49-F238E27FC236}">
+                <a16:creationId xmlns:a16="http://schemas.microsoft.com/office/drawing/2014/main" id="{17DD37CA-0A46-C702-7882-8B9407CFC26B}"/>
+              </a:ext>
+            </a:extLst>
+          </p:cNvPr>
+          <p:cNvPicPr>
+            <a:picLocks noChangeAspect="1"/>
+          </p:cNvPicPr>
+          <p:nvPr/>
+        </p:nvPicPr>
+        <p:blipFill>
+          <a:blip r:embed="rId3"/>
+          <a:stretch>
+            <a:fillRect/>
+          </a:stretch>
+        </p:blipFill>
+        <p:spPr>
+          <a:xfrm>
+            <a:off x="1810789" y="2854961"/>
+            <a:ext cx="8594548" cy="3779073"/>
+          </a:xfrm>
+          <a:prstGeom prst="rect">
+            <a:avLst/>
+          </a:prstGeom>
+        </p:spPr>
+      </p:pic>
+    </p:spTree>
+    <p:extLst>
+      <p:ext uri="{BB962C8B-B14F-4D97-AF65-F5344CB8AC3E}">
+        <p14:creationId xmlns:p14="http://schemas.microsoft.com/office/powerpoint/2010/main" val="1073859656"/>
+      </p:ext>
+    </p:extLst>
+  </p:cSld>
+  <p:clrMapOvr>
+    <a:masterClrMapping/>
+  </p:clrMapOvr>
+</p:sld>
+</file>
+
+<file path=ppt/slides/slide42.xml><?xml version="1.0" encoding="utf-8"?>
+<p:sld xmlns:a="http://schemas.openxmlformats.org/drawingml/2006/main" xmlns:r="http://schemas.openxmlformats.org/officeDocument/2006/relationships" xmlns:p="http://schemas.openxmlformats.org/presentationml/2006/main">
+  <p:cSld>
+    <p:spTree>
+      <p:nvGrpSpPr>
+        <p:cNvPr id="1" name=""/>
+        <p:cNvGrpSpPr/>
+        <p:nvPr/>
+      </p:nvGrpSpPr>
+      <p:grpSpPr>
+        <a:xfrm>
+          <a:off x="0" y="0"/>
+          <a:ext cx="0" cy="0"/>
+          <a:chOff x="0" y="0"/>
+          <a:chExt cx="0" cy="0"/>
+        </a:xfrm>
+      </p:grpSpPr>
+      <p:pic>
+        <p:nvPicPr>
+          <p:cNvPr id="7" name="Obrázok 6">
+            <a:extLst>
+              <a:ext uri="{FF2B5EF4-FFF2-40B4-BE49-F238E27FC236}">
+                <a16:creationId xmlns:a16="http://schemas.microsoft.com/office/drawing/2014/main" id="{74206440-B7E5-6E89-1B6A-E1F563A66F57}"/>
+              </a:ext>
+            </a:extLst>
+          </p:cNvPr>
+          <p:cNvPicPr>
+            <a:picLocks noChangeAspect="1"/>
+          </p:cNvPicPr>
+          <p:nvPr/>
+        </p:nvPicPr>
+        <p:blipFill>
+          <a:blip r:embed="rId2"/>
+          <a:stretch>
+            <a:fillRect/>
+          </a:stretch>
+        </p:blipFill>
+        <p:spPr>
+          <a:xfrm>
+            <a:off x="1729992" y="1746803"/>
+            <a:ext cx="8732016" cy="3364394"/>
+          </a:xfrm>
+          <a:prstGeom prst="rect">
+            <a:avLst/>
+          </a:prstGeom>
+        </p:spPr>
+      </p:pic>
+    </p:spTree>
+    <p:extLst>
+      <p:ext uri="{BB962C8B-B14F-4D97-AF65-F5344CB8AC3E}">
+        <p14:creationId xmlns:p14="http://schemas.microsoft.com/office/powerpoint/2010/main" val="2509989209"/>
+      </p:ext>
+    </p:extLst>
+  </p:cSld>
+  <p:clrMapOvr>
+    <a:masterClrMapping/>
+  </p:clrMapOvr>
+</p:sld>
+</file>
+
+<file path=ppt/slides/slide43.xml><?xml version="1.0" encoding="utf-8"?>
+<p:sld xmlns:a="http://schemas.openxmlformats.org/drawingml/2006/main" xmlns:r="http://schemas.openxmlformats.org/officeDocument/2006/relationships" xmlns:p="http://schemas.openxmlformats.org/presentationml/2006/main">
+  <p:cSld>
+    <p:spTree>
+      <p:nvGrpSpPr>
+        <p:cNvPr id="1" name=""/>
+        <p:cNvGrpSpPr/>
+        <p:nvPr/>
+      </p:nvGrpSpPr>
+      <p:grpSpPr>
+        <a:xfrm>
+          <a:off x="0" y="0"/>
+          <a:ext cx="0" cy="0"/>
+          <a:chOff x="0" y="0"/>
+          <a:chExt cx="0" cy="0"/>
+        </a:xfrm>
+      </p:grpSpPr>
+      <p:sp>
+        <p:nvSpPr>
+          <p:cNvPr id="2" name="Nadpis 1">
+            <a:extLst>
+              <a:ext uri="{FF2B5EF4-FFF2-40B4-BE49-F238E27FC236}">
+                <a16:creationId xmlns:a16="http://schemas.microsoft.com/office/drawing/2014/main" id="{8A717DC2-79FF-65EF-A414-BD2365104601}"/>
+              </a:ext>
+            </a:extLst>
+          </p:cNvPr>
+          <p:cNvSpPr>
+            <a:spLocks noGrp="1"/>
+          </p:cNvSpPr>
+          <p:nvPr>
+            <p:ph type="title"/>
+          </p:nvPr>
+        </p:nvSpPr>
+        <p:spPr>
+          <a:xfrm>
+            <a:off x="838200" y="2766218"/>
+            <a:ext cx="10515600" cy="1325563"/>
+          </a:xfrm>
+        </p:spPr>
+        <p:txBody>
+          <a:bodyPr/>
+          <a:lstStyle/>
+          <a:p>
+            <a:pPr algn="ctr"/>
+            <a:r>
+              <a:rPr lang="sk-SK" dirty="0"/>
+              <a:t>Ďakujeme za pozornosť!</a:t>
+            </a:r>
+          </a:p>
+        </p:txBody>
+      </p:sp>
+    </p:spTree>
+    <p:extLst>
+      <p:ext uri="{BB962C8B-B14F-4D97-AF65-F5344CB8AC3E}">
+        <p14:creationId xmlns:p14="http://schemas.microsoft.com/office/powerpoint/2010/main" val="2962729752"/>
       </p:ext>
     </p:extLst>
   </p:cSld>

</xml_diff>